<commit_message>
things to investigate in the future!! think about them
</commit_message>
<xml_diff>
--- a/presentation_digit_recog2.pptx
+++ b/presentation_digit_recog2.pptx
@@ -15,13 +15,15 @@
     <p:sldId id="273" r:id="rId9"/>
     <p:sldId id="268" r:id="rId10"/>
     <p:sldId id="265" r:id="rId11"/>
-    <p:sldId id="274" r:id="rId12"/>
-    <p:sldId id="266" r:id="rId13"/>
-    <p:sldId id="269" r:id="rId14"/>
-    <p:sldId id="270" r:id="rId15"/>
-    <p:sldId id="263" r:id="rId16"/>
-    <p:sldId id="271" r:id="rId17"/>
-    <p:sldId id="272" r:id="rId18"/>
+    <p:sldId id="276" r:id="rId12"/>
+    <p:sldId id="274" r:id="rId13"/>
+    <p:sldId id="266" r:id="rId14"/>
+    <p:sldId id="269" r:id="rId15"/>
+    <p:sldId id="270" r:id="rId16"/>
+    <p:sldId id="263" r:id="rId17"/>
+    <p:sldId id="271" r:id="rId18"/>
+    <p:sldId id="275" r:id="rId19"/>
+    <p:sldId id="272" r:id="rId20"/>
   </p:sldIdLst>
   <p:sldSz cx="12192000" cy="6858000"/>
   <p:notesSz cx="6858000" cy="9144000"/>
@@ -122,7 +124,7 @@
   </p:defaultTextStyle>
   <p:extLst>
     <p:ext uri="{EFAFB233-063F-42B5-8137-9DF3F51BA10A}">
-      <p15:sldGuideLst xmlns:p15="http://schemas.microsoft.com/office/powerpoint/2012/main">
+      <p15:sldGuideLst xmlns:p15="http://schemas.microsoft.com/office/powerpoint/2012/main" xmlns="">
         <p15:guide id="1" orient="horz" pos="2160">
           <p15:clr>
             <a:srgbClr val="A4A3A4"/>
@@ -345,7 +347,7 @@
           <a:p>
             <a:fld id="{29E7901B-09AF-4D4A-907F-86E00F8E0E92}" type="slidenum">
               <a:rPr lang="de-DE" smtClean="0"/>
-              <a:t>‹Nr.›</a:t>
+              <a:t>‹#›</a:t>
             </a:fld>
             <a:endParaRPr lang="de-DE"/>
           </a:p>
@@ -515,7 +517,7 @@
           <a:p>
             <a:fld id="{29E7901B-09AF-4D4A-907F-86E00F8E0E92}" type="slidenum">
               <a:rPr lang="de-DE" smtClean="0"/>
-              <a:t>‹Nr.›</a:t>
+              <a:t>‹#›</a:t>
             </a:fld>
             <a:endParaRPr lang="de-DE"/>
           </a:p>
@@ -695,7 +697,7 @@
           <a:p>
             <a:fld id="{29E7901B-09AF-4D4A-907F-86E00F8E0E92}" type="slidenum">
               <a:rPr lang="de-DE" smtClean="0"/>
-              <a:t>‹Nr.›</a:t>
+              <a:t>‹#›</a:t>
             </a:fld>
             <a:endParaRPr lang="de-DE"/>
           </a:p>
@@ -898,7 +900,7 @@
           <a:p>
             <a:fld id="{29E7901B-09AF-4D4A-907F-86E00F8E0E92}" type="slidenum">
               <a:rPr lang="de-DE" smtClean="0"/>
-              <a:t>‹Nr.›</a:t>
+              <a:t>‹#›</a:t>
             </a:fld>
             <a:endParaRPr lang="de-DE"/>
           </a:p>
@@ -1068,7 +1070,7 @@
           <a:p>
             <a:fld id="{29E7901B-09AF-4D4A-907F-86E00F8E0E92}" type="slidenum">
               <a:rPr lang="de-DE" smtClean="0"/>
-              <a:t>‹Nr.›</a:t>
+              <a:t>‹#›</a:t>
             </a:fld>
             <a:endParaRPr lang="de-DE"/>
           </a:p>
@@ -1319,7 +1321,7 @@
           <a:p>
             <a:fld id="{29E7901B-09AF-4D4A-907F-86E00F8E0E92}" type="slidenum">
               <a:rPr lang="de-DE" smtClean="0"/>
-              <a:t>‹Nr.›</a:t>
+              <a:t>‹#›</a:t>
             </a:fld>
             <a:endParaRPr lang="de-DE"/>
           </a:p>
@@ -1551,7 +1553,7 @@
           <a:p>
             <a:fld id="{29E7901B-09AF-4D4A-907F-86E00F8E0E92}" type="slidenum">
               <a:rPr lang="de-DE" smtClean="0"/>
-              <a:t>‹Nr.›</a:t>
+              <a:t>‹#›</a:t>
             </a:fld>
             <a:endParaRPr lang="de-DE"/>
           </a:p>
@@ -1898,7 +1900,7 @@
           <a:p>
             <a:fld id="{29E7901B-09AF-4D4A-907F-86E00F8E0E92}" type="slidenum">
               <a:rPr lang="de-DE" smtClean="0"/>
-              <a:t>‹Nr.›</a:t>
+              <a:t>‹#›</a:t>
             </a:fld>
             <a:endParaRPr lang="de-DE"/>
           </a:p>
@@ -2016,7 +2018,7 @@
           <a:p>
             <a:fld id="{29E7901B-09AF-4D4A-907F-86E00F8E0E92}" type="slidenum">
               <a:rPr lang="de-DE" smtClean="0"/>
-              <a:t>‹Nr.›</a:t>
+              <a:t>‹#›</a:t>
             </a:fld>
             <a:endParaRPr lang="de-DE"/>
           </a:p>
@@ -2134,7 +2136,7 @@
           <a:p>
             <a:fld id="{29E7901B-09AF-4D4A-907F-86E00F8E0E92}" type="slidenum">
               <a:rPr lang="de-DE" smtClean="0"/>
-              <a:t>‹Nr.›</a:t>
+              <a:t>‹#›</a:t>
             </a:fld>
             <a:endParaRPr lang="de-DE"/>
           </a:p>
@@ -2418,7 +2420,7 @@
           <a:p>
             <a:fld id="{29E7901B-09AF-4D4A-907F-86E00F8E0E92}" type="slidenum">
               <a:rPr lang="de-DE" smtClean="0"/>
-              <a:t>‹Nr.›</a:t>
+              <a:t>‹#›</a:t>
             </a:fld>
             <a:endParaRPr lang="de-DE"/>
           </a:p>
@@ -2588,7 +2590,7 @@
           <a:p>
             <a:fld id="{29E7901B-09AF-4D4A-907F-86E00F8E0E92}" type="slidenum">
               <a:rPr lang="de-DE" smtClean="0"/>
-              <a:t>‹Nr.›</a:t>
+              <a:t>‹#›</a:t>
             </a:fld>
             <a:endParaRPr lang="de-DE"/>
           </a:p>
@@ -2852,7 +2854,7 @@
           <a:p>
             <a:fld id="{29E7901B-09AF-4D4A-907F-86E00F8E0E92}" type="slidenum">
               <a:rPr lang="de-DE" smtClean="0"/>
-              <a:t>‹Nr.›</a:t>
+              <a:t>‹#›</a:t>
             </a:fld>
             <a:endParaRPr lang="de-DE"/>
           </a:p>
@@ -3022,7 +3024,7 @@
           <a:p>
             <a:fld id="{29E7901B-09AF-4D4A-907F-86E00F8E0E92}" type="slidenum">
               <a:rPr lang="de-DE" smtClean="0"/>
-              <a:t>‹Nr.›</a:t>
+              <a:t>‹#›</a:t>
             </a:fld>
             <a:endParaRPr lang="de-DE"/>
           </a:p>
@@ -3202,7 +3204,7 @@
           <a:p>
             <a:fld id="{29E7901B-09AF-4D4A-907F-86E00F8E0E92}" type="slidenum">
               <a:rPr lang="de-DE" smtClean="0"/>
-              <a:t>‹Nr.›</a:t>
+              <a:t>‹#›</a:t>
             </a:fld>
             <a:endParaRPr lang="de-DE"/>
           </a:p>
@@ -3489,7 +3491,7 @@
           <a:p>
             <a:fld id="{29E7901B-09AF-4D4A-907F-86E00F8E0E92}" type="slidenum">
               <a:rPr lang="de-DE" smtClean="0"/>
-              <a:t>‹Nr.›</a:t>
+              <a:t>‹#›</a:t>
             </a:fld>
             <a:endParaRPr lang="de-DE"/>
           </a:p>
@@ -3697,7 +3699,7 @@
           <a:p>
             <a:fld id="{29E7901B-09AF-4D4A-907F-86E00F8E0E92}" type="slidenum">
               <a:rPr lang="de-DE" smtClean="0"/>
-              <a:t>‹Nr.›</a:t>
+              <a:t>‹#›</a:t>
             </a:fld>
             <a:endParaRPr lang="de-DE"/>
           </a:p>
@@ -4040,7 +4042,7 @@
           <a:p>
             <a:fld id="{29E7901B-09AF-4D4A-907F-86E00F8E0E92}" type="slidenum">
               <a:rPr lang="de-DE" smtClean="0"/>
-              <a:t>‹Nr.›</a:t>
+              <a:t>‹#›</a:t>
             </a:fld>
             <a:endParaRPr lang="de-DE"/>
           </a:p>
@@ -4315,7 +4317,7 @@
           <a:p>
             <a:fld id="{29E7901B-09AF-4D4A-907F-86E00F8E0E92}" type="slidenum">
               <a:rPr lang="de-DE" smtClean="0"/>
-              <a:t>‹Nr.›</a:t>
+              <a:t>‹#›</a:t>
             </a:fld>
             <a:endParaRPr lang="de-DE"/>
           </a:p>
@@ -4694,7 +4696,7 @@
           <a:p>
             <a:fld id="{29E7901B-09AF-4D4A-907F-86E00F8E0E92}" type="slidenum">
               <a:rPr lang="de-DE" smtClean="0"/>
-              <a:t>‹Nr.›</a:t>
+              <a:t>‹#›</a:t>
             </a:fld>
             <a:endParaRPr lang="de-DE"/>
           </a:p>
@@ -4812,7 +4814,7 @@
           <a:p>
             <a:fld id="{29E7901B-09AF-4D4A-907F-86E00F8E0E92}" type="slidenum">
               <a:rPr lang="de-DE" smtClean="0"/>
-              <a:t>‹Nr.›</a:t>
+              <a:t>‹#›</a:t>
             </a:fld>
             <a:endParaRPr lang="de-DE"/>
           </a:p>
@@ -4991,7 +4993,7 @@
           <a:p>
             <a:fld id="{29E7901B-09AF-4D4A-907F-86E00F8E0E92}" type="slidenum">
               <a:rPr lang="de-DE" smtClean="0"/>
-              <a:t>‹Nr.›</a:t>
+              <a:t>‹#›</a:t>
             </a:fld>
             <a:endParaRPr lang="de-DE"/>
           </a:p>
@@ -5242,7 +5244,7 @@
           <a:p>
             <a:fld id="{29E7901B-09AF-4D4A-907F-86E00F8E0E92}" type="slidenum">
               <a:rPr lang="de-DE" smtClean="0"/>
-              <a:t>‹Nr.›</a:t>
+              <a:t>‹#›</a:t>
             </a:fld>
             <a:endParaRPr lang="de-DE"/>
           </a:p>
@@ -5609,7 +5611,7 @@
           <a:p>
             <a:fld id="{29E7901B-09AF-4D4A-907F-86E00F8E0E92}" type="slidenum">
               <a:rPr lang="de-DE" smtClean="0"/>
-              <a:t>‹Nr.›</a:t>
+              <a:t>‹#›</a:t>
             </a:fld>
             <a:endParaRPr lang="de-DE"/>
           </a:p>
@@ -5965,7 +5967,7 @@
           <a:p>
             <a:fld id="{29E7901B-09AF-4D4A-907F-86E00F8E0E92}" type="slidenum">
               <a:rPr lang="de-DE" smtClean="0"/>
-              <a:t>‹Nr.›</a:t>
+              <a:t>‹#›</a:t>
             </a:fld>
             <a:endParaRPr lang="de-DE"/>
           </a:p>
@@ -6135,7 +6137,7 @@
           <a:p>
             <a:fld id="{29E7901B-09AF-4D4A-907F-86E00F8E0E92}" type="slidenum">
               <a:rPr lang="de-DE" smtClean="0"/>
-              <a:t>‹Nr.›</a:t>
+              <a:t>‹#›</a:t>
             </a:fld>
             <a:endParaRPr lang="de-DE"/>
           </a:p>
@@ -6391,7 +6393,7 @@
           <a:p>
             <a:fld id="{29E7901B-09AF-4D4A-907F-86E00F8E0E92}" type="slidenum">
               <a:rPr lang="de-DE" smtClean="0"/>
-              <a:t>‹Nr.›</a:t>
+              <a:t>‹#›</a:t>
             </a:fld>
             <a:endParaRPr lang="de-DE"/>
           </a:p>
@@ -6623,7 +6625,7 @@
           <a:p>
             <a:fld id="{29E7901B-09AF-4D4A-907F-86E00F8E0E92}" type="slidenum">
               <a:rPr lang="de-DE" smtClean="0"/>
-              <a:t>‹Nr.›</a:t>
+              <a:t>‹#›</a:t>
             </a:fld>
             <a:endParaRPr lang="de-DE"/>
           </a:p>
@@ -6970,7 +6972,7 @@
           <a:p>
             <a:fld id="{29E7901B-09AF-4D4A-907F-86E00F8E0E92}" type="slidenum">
               <a:rPr lang="de-DE" smtClean="0"/>
-              <a:t>‹Nr.›</a:t>
+              <a:t>‹#›</a:t>
             </a:fld>
             <a:endParaRPr lang="de-DE"/>
           </a:p>
@@ -7088,7 +7090,7 @@
           <a:p>
             <a:fld id="{29E7901B-09AF-4D4A-907F-86E00F8E0E92}" type="slidenum">
               <a:rPr lang="de-DE" smtClean="0"/>
-              <a:t>‹Nr.›</a:t>
+              <a:t>‹#›</a:t>
             </a:fld>
             <a:endParaRPr lang="de-DE"/>
           </a:p>
@@ -7206,7 +7208,7 @@
           <a:p>
             <a:fld id="{29E7901B-09AF-4D4A-907F-86E00F8E0E92}" type="slidenum">
               <a:rPr lang="de-DE" smtClean="0"/>
-              <a:t>‹Nr.›</a:t>
+              <a:t>‹#›</a:t>
             </a:fld>
             <a:endParaRPr lang="de-DE"/>
           </a:p>
@@ -7490,7 +7492,7 @@
           <a:p>
             <a:fld id="{29E7901B-09AF-4D4A-907F-86E00F8E0E92}" type="slidenum">
               <a:rPr lang="de-DE" smtClean="0"/>
-              <a:t>‹Nr.›</a:t>
+              <a:t>‹#›</a:t>
             </a:fld>
             <a:endParaRPr lang="de-DE"/>
           </a:p>
@@ -7754,7 +7756,7 @@
           <a:p>
             <a:fld id="{29E7901B-09AF-4D4A-907F-86E00F8E0E92}" type="slidenum">
               <a:rPr lang="de-DE" smtClean="0"/>
-              <a:t>‹Nr.›</a:t>
+              <a:t>‹#›</a:t>
             </a:fld>
             <a:endParaRPr lang="de-DE"/>
           </a:p>
@@ -8005,7 +8007,7 @@
           <a:p>
             <a:fld id="{29E7901B-09AF-4D4A-907F-86E00F8E0E92}" type="slidenum">
               <a:rPr lang="de-DE" smtClean="0"/>
-              <a:t>‹Nr.›</a:t>
+              <a:t>‹#›</a:t>
             </a:fld>
             <a:endParaRPr lang="de-DE"/>
           </a:p>
@@ -8535,7 +8537,7 @@
           <a:p>
             <a:fld id="{29E7901B-09AF-4D4A-907F-86E00F8E0E92}" type="slidenum">
               <a:rPr lang="de-DE" smtClean="0"/>
-              <a:t>‹Nr.›</a:t>
+              <a:t>‹#›</a:t>
             </a:fld>
             <a:endParaRPr lang="de-DE"/>
           </a:p>
@@ -9133,7 +9135,7 @@
           <a:p>
             <a:fld id="{29E7901B-09AF-4D4A-907F-86E00F8E0E92}" type="slidenum">
               <a:rPr lang="de-DE" smtClean="0"/>
-              <a:t>‹Nr.›</a:t>
+              <a:t>‹#›</a:t>
             </a:fld>
             <a:endParaRPr lang="de-DE"/>
           </a:p>
@@ -9619,7 +9621,7 @@
           <p:cNvPr id="5" name="Grafik 4">
             <a:extLst>
               <a:ext uri="{FF2B5EF4-FFF2-40B4-BE49-F238E27FC236}">
-                <a16:creationId xmlns:a16="http://schemas.microsoft.com/office/drawing/2014/main" id="{541C1A54-8968-4CEF-8CA1-E84FB3A8524D}"/>
+                <a16:creationId xmlns:a16="http://schemas.microsoft.com/office/drawing/2014/main" xmlns="" id="{541C1A54-8968-4CEF-8CA1-E84FB3A8524D}"/>
               </a:ext>
             </a:extLst>
           </p:cNvPr>
@@ -9655,7 +9657,7 @@
           <p:cNvPr id="2" name="Titel 1">
             <a:extLst>
               <a:ext uri="{FF2B5EF4-FFF2-40B4-BE49-F238E27FC236}">
-                <a16:creationId xmlns:a16="http://schemas.microsoft.com/office/drawing/2014/main" id="{90A6468B-D0CD-4DC7-A3AD-DA2E2B071416}"/>
+                <a16:creationId xmlns:a16="http://schemas.microsoft.com/office/drawing/2014/main" xmlns="" id="{90A6468B-D0CD-4DC7-A3AD-DA2E2B071416}"/>
               </a:ext>
             </a:extLst>
           </p:cNvPr>
@@ -9694,7 +9696,7 @@
           <p:cNvPr id="3" name="Untertitel 2">
             <a:extLst>
               <a:ext uri="{FF2B5EF4-FFF2-40B4-BE49-F238E27FC236}">
-                <a16:creationId xmlns:a16="http://schemas.microsoft.com/office/drawing/2014/main" id="{65A5BDD7-952D-4603-93C5-6E59619C765A}"/>
+                <a16:creationId xmlns:a16="http://schemas.microsoft.com/office/drawing/2014/main" xmlns="" id="{65A5BDD7-952D-4603-93C5-6E59619C765A}"/>
               </a:ext>
             </a:extLst>
           </p:cNvPr>
@@ -9733,10 +9735,10 @@
           <p:cNvPr id="10" name="Straight Connector 9">
             <a:extLst>
               <a:ext uri="{FF2B5EF4-FFF2-40B4-BE49-F238E27FC236}">
-                <a16:creationId xmlns:a16="http://schemas.microsoft.com/office/drawing/2014/main" id="{F3CC58E3-BDF9-495D-9327-85F68058BE32}"/>
+                <a16:creationId xmlns:a16="http://schemas.microsoft.com/office/drawing/2014/main" xmlns="" id="{F3CC58E3-BDF9-495D-9327-85F68058BE32}"/>
               </a:ext>
               <a:ext uri="{C183D7F6-B498-43B3-948B-1728B52AA6E4}">
-                <adec:decorative xmlns:adec="http://schemas.microsoft.com/office/drawing/2017/decorative" val="1"/>
+                <adec:decorative xmlns:adec="http://schemas.microsoft.com/office/drawing/2017/decorative" xmlns="" val="1"/>
               </a:ext>
             </a:extLst>
           </p:cNvPr>
@@ -9746,7 +9748,7 @@
           <p:nvPr>
             <p:extLst>
               <p:ext uri="{386F3935-93C4-4BCD-93E2-E3B085C9AB24}">
-                <p16:designElem xmlns:p16="http://schemas.microsoft.com/office/powerpoint/2015/main" val="1"/>
+                <p16:designElem xmlns:p16="http://schemas.microsoft.com/office/powerpoint/2015/main" xmlns="" val="1"/>
               </p:ext>
             </p:extLst>
           </p:nvPr>
@@ -9787,10 +9789,10 @@
           <p:cNvPr id="12" name="Rectangle 11">
             <a:extLst>
               <a:ext uri="{FF2B5EF4-FFF2-40B4-BE49-F238E27FC236}">
-                <a16:creationId xmlns:a16="http://schemas.microsoft.com/office/drawing/2014/main" id="{DA0CA737-33FC-47E3-965A-D1C2CAA62894}"/>
+                <a16:creationId xmlns:a16="http://schemas.microsoft.com/office/drawing/2014/main" xmlns="" id="{DA0CA737-33FC-47E3-965A-D1C2CAA62894}"/>
               </a:ext>
               <a:ext uri="{C183D7F6-B498-43B3-948B-1728B52AA6E4}">
-                <adec:decorative xmlns:adec="http://schemas.microsoft.com/office/drawing/2017/decorative" val="1"/>
+                <adec:decorative xmlns:adec="http://schemas.microsoft.com/office/drawing/2017/decorative" xmlns="" val="1"/>
               </a:ext>
             </a:extLst>
           </p:cNvPr>
@@ -9800,7 +9802,7 @@
           <p:nvPr>
             <p:extLst>
               <p:ext uri="{386F3935-93C4-4BCD-93E2-E3B085C9AB24}">
-                <p16:designElem xmlns:p16="http://schemas.microsoft.com/office/powerpoint/2015/main" val="1"/>
+                <p16:designElem xmlns:p16="http://schemas.microsoft.com/office/powerpoint/2015/main" xmlns="" val="1"/>
               </p:ext>
             </p:extLst>
           </p:nvPr>
@@ -9842,10 +9844,10 @@
           <p:cNvPr id="14" name="Rectangle 13">
             <a:extLst>
               <a:ext uri="{FF2B5EF4-FFF2-40B4-BE49-F238E27FC236}">
-                <a16:creationId xmlns:a16="http://schemas.microsoft.com/office/drawing/2014/main" id="{22189942-24EB-488E-8B69-EB80F7E53E36}"/>
+                <a16:creationId xmlns:a16="http://schemas.microsoft.com/office/drawing/2014/main" xmlns="" id="{22189942-24EB-488E-8B69-EB80F7E53E36}"/>
               </a:ext>
               <a:ext uri="{C183D7F6-B498-43B3-948B-1728B52AA6E4}">
-                <adec:decorative xmlns:adec="http://schemas.microsoft.com/office/drawing/2017/decorative" val="1"/>
+                <adec:decorative xmlns:adec="http://schemas.microsoft.com/office/drawing/2017/decorative" xmlns="" val="1"/>
               </a:ext>
             </a:extLst>
           </p:cNvPr>
@@ -9855,7 +9857,7 @@
           <p:nvPr>
             <p:extLst>
               <p:ext uri="{386F3935-93C4-4BCD-93E2-E3B085C9AB24}">
-                <p16:designElem xmlns:p16="http://schemas.microsoft.com/office/powerpoint/2015/main" val="1"/>
+                <p16:designElem xmlns:p16="http://schemas.microsoft.com/office/powerpoint/2015/main" xmlns="" val="1"/>
               </p:ext>
             </p:extLst>
           </p:nvPr>
@@ -9922,84 +9924,335 @@
           <a:chExt cx="0" cy="0"/>
         </a:xfrm>
       </p:grpSpPr>
-      <p:pic>
-        <p:nvPicPr>
-          <p:cNvPr id="10" name="Inhaltsplatzhalter 9">
+      <p:sp>
+        <p:nvSpPr>
+          <p:cNvPr id="2" name="Titel 1">
             <a:extLst>
               <a:ext uri="{FF2B5EF4-FFF2-40B4-BE49-F238E27FC236}">
-                <a16:creationId xmlns:a16="http://schemas.microsoft.com/office/drawing/2014/main" id="{65A23C4D-F599-40EB-9F55-473E092C8DBD}"/>
+                <a16:creationId xmlns:a16="http://schemas.microsoft.com/office/drawing/2014/main" xmlns="" id="{3D022FA1-1227-4EA1-8EB1-679CE9C5CFCD}"/>
               </a:ext>
             </a:extLst>
           </p:cNvPr>
-          <p:cNvPicPr>
-            <a:picLocks noGrp="1" noChangeAspect="1"/>
-          </p:cNvPicPr>
-          <p:nvPr>
-            <p:ph sz="half" idx="4294967295"/>
-          </p:nvPr>
-        </p:nvPicPr>
-        <p:blipFill rotWithShape="1">
-          <a:blip r:embed="rId2">
-            <a:extLst>
-              <a:ext uri="{28A0092B-C50C-407E-A947-70E740481C1C}">
-                <a14:useLocalDpi xmlns:a14="http://schemas.microsoft.com/office/drawing/2010/main" val="0"/>
-              </a:ext>
-            </a:extLst>
-          </a:blip>
-          <a:srcRect t="-1" r="1753" b="40808"/>
-          <a:stretch/>
-        </p:blipFill>
-        <p:spPr>
-          <a:xfrm>
-            <a:off x="6511491" y="1387642"/>
-            <a:ext cx="3439310" cy="4900863"/>
-          </a:xfrm>
-        </p:spPr>
-      </p:pic>
-      <p:pic>
-        <p:nvPicPr>
-          <p:cNvPr id="8" name="Inhaltsplatzhalter 7">
+          <p:cNvSpPr>
+            <a:spLocks noGrp="1"/>
+          </p:cNvSpPr>
+          <p:nvPr>
+            <p:ph type="title"/>
+          </p:nvPr>
+        </p:nvSpPr>
+        <p:spPr/>
+        <p:txBody>
+          <a:bodyPr>
+            <a:normAutofit/>
+          </a:bodyPr>
+          <a:lstStyle/>
+          <a:p>
+            <a:r>
+              <a:rPr lang="de-DE" sz="5400" dirty="0" err="1"/>
+              <a:t>Finding</a:t>
+            </a:r>
+            <a:r>
+              <a:rPr lang="de-DE" sz="5400" dirty="0"/>
+              <a:t> </a:t>
+            </a:r>
+            <a:r>
+              <a:rPr lang="de-DE" sz="5400" dirty="0" err="1"/>
+              <a:t>meta</a:t>
+            </a:r>
+            <a:r>
+              <a:rPr lang="de-DE" sz="5400" dirty="0"/>
+              <a:t> </a:t>
+            </a:r>
+            <a:r>
+              <a:rPr lang="de-DE" sz="5400" dirty="0" err="1"/>
+              <a:t>digits</a:t>
+            </a:r>
+            <a:endParaRPr lang="de-DE" sz="5400" dirty="0"/>
+          </a:p>
+        </p:txBody>
+      </p:sp>
+      <p:sp>
+        <p:nvSpPr>
+          <p:cNvPr id="3" name="Inhaltsplatzhalter 2">
             <a:extLst>
               <a:ext uri="{FF2B5EF4-FFF2-40B4-BE49-F238E27FC236}">
-                <a16:creationId xmlns:a16="http://schemas.microsoft.com/office/drawing/2014/main" id="{AC8FC20D-C4BB-4858-9AA7-67A6D2F24CB1}"/>
+                <a16:creationId xmlns:a16="http://schemas.microsoft.com/office/drawing/2014/main" xmlns="" id="{56D22BFB-FDAA-4D7E-88D9-C29E57B7C51D}"/>
               </a:ext>
             </a:extLst>
           </p:cNvPr>
-          <p:cNvPicPr>
-            <a:picLocks noGrp="1" noChangeAspect="1"/>
-          </p:cNvPicPr>
-          <p:nvPr>
-            <p:ph sz="half" idx="4294967295"/>
-          </p:nvPr>
-        </p:nvPicPr>
-        <p:blipFill rotWithShape="1">
-          <a:blip r:embed="rId3">
-            <a:extLst>
-              <a:ext uri="{28A0092B-C50C-407E-A947-70E740481C1C}">
-                <a14:useLocalDpi xmlns:a14="http://schemas.microsoft.com/office/drawing/2010/main" val="0"/>
-              </a:ext>
-            </a:extLst>
-          </a:blip>
-          <a:srcRect b="39910"/>
-          <a:stretch/>
-        </p:blipFill>
+          <p:cNvSpPr>
+            <a:spLocks noGrp="1"/>
+          </p:cNvSpPr>
+          <p:nvPr>
+            <p:ph idx="1"/>
+          </p:nvPr>
+        </p:nvSpPr>
+        <p:spPr/>
+        <p:txBody>
+          <a:bodyPr/>
+          <a:lstStyle/>
+          <a:p>
+            <a:pPr marL="0" indent="0">
+              <a:buNone/>
+            </a:pPr>
+            <a:r>
+              <a:rPr lang="de-DE" sz="2400" dirty="0">
+                <a:solidFill>
+                  <a:schemeClr val="tx1">
+                    <a:lumMod val="95000"/>
+                    <a:lumOff val="5000"/>
+                  </a:schemeClr>
+                </a:solidFill>
+              </a:rPr>
+              <a:t> </a:t>
+            </a:r>
+            <a:r>
+              <a:rPr lang="de-DE" sz="2400" u="sng" dirty="0" err="1">
+                <a:solidFill>
+                  <a:schemeClr val="tx1">
+                    <a:lumMod val="95000"/>
+                    <a:lumOff val="5000"/>
+                  </a:schemeClr>
+                </a:solidFill>
+              </a:rPr>
+              <a:t>Objective</a:t>
+            </a:r>
+            <a:r>
+              <a:rPr lang="de-DE" sz="2400" dirty="0">
+                <a:solidFill>
+                  <a:schemeClr val="tx1">
+                    <a:lumMod val="95000"/>
+                    <a:lumOff val="5000"/>
+                  </a:schemeClr>
+                </a:solidFill>
+              </a:rPr>
+              <a:t>: </a:t>
+            </a:r>
+            <a:r>
+              <a:rPr lang="de-DE" sz="2400" dirty="0" smtClean="0">
+                <a:solidFill>
+                  <a:schemeClr val="tx1">
+                    <a:lumMod val="95000"/>
+                    <a:lumOff val="5000"/>
+                  </a:schemeClr>
+                </a:solidFill>
+              </a:rPr>
+              <a:t> Some</a:t>
+            </a:r>
+            <a:r>
+              <a:rPr lang="de-DE" sz="2400" dirty="0" smtClean="0">
+                <a:solidFill>
+                  <a:schemeClr val="tx1">
+                    <a:lumMod val="95000"/>
+                    <a:lumOff val="5000"/>
+                  </a:schemeClr>
+                </a:solidFill>
+              </a:rPr>
+              <a:t>thing </a:t>
+            </a:r>
+            <a:r>
+              <a:rPr lang="de-DE" sz="2400" dirty="0" err="1" smtClean="0">
+                <a:solidFill>
+                  <a:schemeClr val="tx1">
+                    <a:lumMod val="95000"/>
+                    <a:lumOff val="5000"/>
+                  </a:schemeClr>
+                </a:solidFill>
+              </a:rPr>
+              <a:t>what</a:t>
+            </a:r>
+            <a:r>
+              <a:rPr lang="de-DE" sz="2400" dirty="0" smtClean="0">
+                <a:solidFill>
+                  <a:schemeClr val="tx1">
+                    <a:lumMod val="95000"/>
+                    <a:lumOff val="5000"/>
+                  </a:schemeClr>
+                </a:solidFill>
+              </a:rPr>
+              <a:t> </a:t>
+            </a:r>
+            <a:r>
+              <a:rPr lang="de-DE" sz="2400" dirty="0" err="1" smtClean="0">
+                <a:solidFill>
+                  <a:schemeClr val="tx1">
+                    <a:lumMod val="95000"/>
+                    <a:lumOff val="5000"/>
+                  </a:schemeClr>
+                </a:solidFill>
+              </a:rPr>
+              <a:t>describes</a:t>
+            </a:r>
+            <a:r>
+              <a:rPr lang="de-DE" sz="2400" dirty="0" smtClean="0">
+                <a:solidFill>
+                  <a:schemeClr val="tx1">
+                    <a:lumMod val="95000"/>
+                    <a:lumOff val="5000"/>
+                  </a:schemeClr>
+                </a:solidFill>
+              </a:rPr>
+              <a:t> </a:t>
+            </a:r>
+            <a:r>
+              <a:rPr lang="de-DE" sz="2400" dirty="0" err="1" smtClean="0">
+                <a:solidFill>
+                  <a:schemeClr val="tx1">
+                    <a:lumMod val="95000"/>
+                    <a:lumOff val="5000"/>
+                  </a:schemeClr>
+                </a:solidFill>
+              </a:rPr>
+              <a:t>digits</a:t>
+            </a:r>
+            <a:r>
+              <a:rPr lang="de-DE" sz="2400" dirty="0" smtClean="0">
+                <a:solidFill>
+                  <a:schemeClr val="tx1">
+                    <a:lumMod val="95000"/>
+                    <a:lumOff val="5000"/>
+                  </a:schemeClr>
+                </a:solidFill>
+              </a:rPr>
+              <a:t> </a:t>
+            </a:r>
+            <a:r>
+              <a:rPr lang="de-DE" sz="2400" dirty="0" err="1" smtClean="0">
+                <a:solidFill>
+                  <a:schemeClr val="tx1">
+                    <a:lumMod val="95000"/>
+                    <a:lumOff val="5000"/>
+                  </a:schemeClr>
+                </a:solidFill>
+              </a:rPr>
+              <a:t>with</a:t>
+            </a:r>
+            <a:r>
+              <a:rPr lang="de-DE" sz="2400" dirty="0" smtClean="0">
+                <a:solidFill>
+                  <a:schemeClr val="tx1">
+                    <a:lumMod val="95000"/>
+                    <a:lumOff val="5000"/>
+                  </a:schemeClr>
+                </a:solidFill>
+              </a:rPr>
+              <a:t> </a:t>
+            </a:r>
+            <a:r>
+              <a:rPr lang="de-DE" sz="2400" dirty="0" err="1" smtClean="0">
+                <a:solidFill>
+                  <a:schemeClr val="tx1">
+                    <a:lumMod val="95000"/>
+                    <a:lumOff val="5000"/>
+                  </a:schemeClr>
+                </a:solidFill>
+              </a:rPr>
+              <a:t>the</a:t>
+            </a:r>
+            <a:r>
+              <a:rPr lang="de-DE" sz="2400" dirty="0" smtClean="0">
+                <a:solidFill>
+                  <a:schemeClr val="tx1">
+                    <a:lumMod val="95000"/>
+                    <a:lumOff val="5000"/>
+                  </a:schemeClr>
+                </a:solidFill>
+              </a:rPr>
+              <a:t> same </a:t>
+            </a:r>
+            <a:r>
+              <a:rPr lang="de-DE" sz="2400" dirty="0" err="1" smtClean="0">
+                <a:solidFill>
+                  <a:schemeClr val="tx1">
+                    <a:lumMod val="95000"/>
+                    <a:lumOff val="5000"/>
+                  </a:schemeClr>
+                </a:solidFill>
+              </a:rPr>
+              <a:t>label</a:t>
+            </a:r>
+            <a:r>
+              <a:rPr lang="de-DE" sz="2400" dirty="0">
+                <a:solidFill>
+                  <a:schemeClr val="tx1">
+                    <a:lumMod val="95000"/>
+                    <a:lumOff val="5000"/>
+                  </a:schemeClr>
+                </a:solidFill>
+              </a:rPr>
+              <a:t>.</a:t>
+            </a:r>
+            <a:r>
+              <a:rPr lang="de-DE" dirty="0"/>
+              <a:t>		</a:t>
+            </a:r>
+          </a:p>
+          <a:p>
+            <a:endParaRPr lang="de-DE" sz="2400" dirty="0" smtClean="0">
+              <a:solidFill>
+                <a:schemeClr val="tx1">
+                  <a:lumMod val="95000"/>
+                  <a:lumOff val="5000"/>
+                </a:schemeClr>
+              </a:solidFill>
+            </a:endParaRPr>
+          </a:p>
+          <a:p>
+            <a:r>
+              <a:rPr lang="de-DE" sz="2400" u="sng" dirty="0" err="1" smtClean="0">
+                <a:solidFill>
+                  <a:schemeClr val="tx1">
+                    <a:lumMod val="95000"/>
+                    <a:lumOff val="5000"/>
+                  </a:schemeClr>
+                </a:solidFill>
+              </a:rPr>
+              <a:t>Reason</a:t>
+            </a:r>
+            <a:r>
+              <a:rPr lang="de-DE" sz="2400" dirty="0" smtClean="0">
+                <a:solidFill>
+                  <a:schemeClr val="tx1">
+                    <a:lumMod val="95000"/>
+                    <a:lumOff val="5000"/>
+                  </a:schemeClr>
+                </a:solidFill>
+              </a:rPr>
+              <a:t>:  </a:t>
+            </a:r>
+            <a:endParaRPr lang="de-DE" sz="2400" dirty="0">
+              <a:solidFill>
+                <a:schemeClr val="tx1">
+                  <a:lumMod val="95000"/>
+                  <a:lumOff val="5000"/>
+                </a:schemeClr>
+              </a:solidFill>
+            </a:endParaRPr>
+          </a:p>
+          <a:p>
+            <a:pPr marL="0" indent="0">
+              <a:buNone/>
+            </a:pPr>
+            <a:endParaRPr lang="de-DE" dirty="0"/>
+          </a:p>
+          <a:p>
+            <a:pPr marL="0" indent="0">
+              <a:buNone/>
+            </a:pPr>
+            <a:endParaRPr lang="de-DE" dirty="0"/>
+          </a:p>
+        </p:txBody>
+      </p:sp>
+      <p:sp>
+        <p:nvSpPr>
+          <p:cNvPr id="4" name="TextBox 3"/>
+          <p:cNvSpPr txBox="1"/>
+          <p:nvPr/>
+        </p:nvSpPr>
         <p:spPr>
           <a:xfrm>
-            <a:off x="1612232" y="1400368"/>
-            <a:ext cx="3457074" cy="5000445"/>
-          </a:xfrm>
-        </p:spPr>
-      </p:pic>
-      <p:sp>
-        <p:nvSpPr>
-          <p:cNvPr id="5" name="TextBox 4"/>
-          <p:cNvSpPr txBox="1"/>
-          <p:nvPr/>
-        </p:nvSpPr>
-        <p:spPr>
-          <a:xfrm>
-            <a:off x="874295" y="409075"/>
-            <a:ext cx="10483515" cy="646331"/>
+            <a:off x="2272684" y="2849732"/>
+            <a:ext cx="8389398" cy="1938992"/>
           </a:xfrm>
           <a:prstGeom prst="rect">
             <a:avLst/>
@@ -10012,24 +10265,47 @@
           </a:bodyPr>
           <a:lstStyle/>
           <a:p>
-            <a:r>
-              <a:rPr lang="en-US" sz="3600" dirty="0">
-                <a:latin typeface="Calibri Light" panose="020F0302020204030204" pitchFamily="34" charset="0"/>
-                <a:cs typeface="Calibri Light" panose="020F0302020204030204" pitchFamily="34" charset="0"/>
-              </a:rPr>
-              <a:t>Two easiest solutions: mean and median meta digits</a:t>
-            </a:r>
-            <a:endParaRPr lang="ru-RU" sz="3600" dirty="0">
-              <a:latin typeface="Calibri Light" panose="020F0302020204030204" pitchFamily="34" charset="0"/>
-              <a:cs typeface="Calibri Light" panose="020F0302020204030204" pitchFamily="34" charset="0"/>
-            </a:endParaRPr>
+            <a:pPr marL="285750" indent="-285750">
+              <a:buFont typeface="Arial" panose="020B0604020202020204" pitchFamily="34" charset="0"/>
+              <a:buChar char="•"/>
+            </a:pPr>
+            <a:r>
+              <a:rPr lang="en-US" sz="2400" dirty="0" smtClean="0"/>
+              <a:t>To see</a:t>
+            </a:r>
+            <a:r>
+              <a:rPr lang="ru-RU" sz="2400" dirty="0" smtClean="0"/>
+              <a:t> </a:t>
+            </a:r>
+            <a:r>
+              <a:rPr lang="en-US" sz="2400" dirty="0" smtClean="0"/>
+              <a:t>a cause for a wrong recognition by KNN by comparing of falsely predicted with Meta</a:t>
+            </a:r>
+          </a:p>
+          <a:p>
+            <a:pPr marL="285750" indent="-285750">
+              <a:buFont typeface="Arial" panose="020B0604020202020204" pitchFamily="34" charset="0"/>
+              <a:buChar char="•"/>
+            </a:pPr>
+            <a:endParaRPr lang="en-US" sz="2400" dirty="0" smtClean="0"/>
+          </a:p>
+          <a:p>
+            <a:pPr marL="285750" indent="-285750">
+              <a:buFont typeface="Arial" panose="020B0604020202020204" pitchFamily="34" charset="0"/>
+              <a:buChar char="•"/>
+            </a:pPr>
+            <a:r>
+              <a:rPr lang="en-US" sz="2400" dirty="0" smtClean="0"/>
+              <a:t>We need a reference point for drawing canvas to evaluate our own hand-written digits</a:t>
+            </a:r>
+            <a:endParaRPr lang="ru-RU" sz="2400" dirty="0"/>
           </a:p>
         </p:txBody>
       </p:sp>
     </p:spTree>
     <p:extLst>
       <p:ext uri="{BB962C8B-B14F-4D97-AF65-F5344CB8AC3E}">
-        <p14:creationId xmlns:p14="http://schemas.microsoft.com/office/powerpoint/2010/main" val="238965826"/>
+        <p14:creationId xmlns:p14="http://schemas.microsoft.com/office/powerpoint/2010/main" val="1548118980"/>
       </p:ext>
     </p:extLst>
   </p:cSld>
@@ -10056,12 +10332,146 @@
           <a:chExt cx="0" cy="0"/>
         </a:xfrm>
       </p:grpSpPr>
+      <p:pic>
+        <p:nvPicPr>
+          <p:cNvPr id="10" name="Inhaltsplatzhalter 9">
+            <a:extLst>
+              <a:ext uri="{FF2B5EF4-FFF2-40B4-BE49-F238E27FC236}">
+                <a16:creationId xmlns:a16="http://schemas.microsoft.com/office/drawing/2014/main" xmlns="" id="{65A23C4D-F599-40EB-9F55-473E092C8DBD}"/>
+              </a:ext>
+            </a:extLst>
+          </p:cNvPr>
+          <p:cNvPicPr>
+            <a:picLocks noGrp="1" noChangeAspect="1"/>
+          </p:cNvPicPr>
+          <p:nvPr>
+            <p:ph sz="half" idx="4294967295"/>
+          </p:nvPr>
+        </p:nvPicPr>
+        <p:blipFill rotWithShape="1">
+          <a:blip r:embed="rId2">
+            <a:extLst>
+              <a:ext uri="{28A0092B-C50C-407E-A947-70E740481C1C}">
+                <a14:useLocalDpi xmlns:a14="http://schemas.microsoft.com/office/drawing/2010/main" val="0"/>
+              </a:ext>
+            </a:extLst>
+          </a:blip>
+          <a:srcRect t="-1" r="1753" b="40808"/>
+          <a:stretch/>
+        </p:blipFill>
+        <p:spPr>
+          <a:xfrm>
+            <a:off x="6511491" y="1387642"/>
+            <a:ext cx="3439310" cy="4900863"/>
+          </a:xfrm>
+        </p:spPr>
+      </p:pic>
+      <p:pic>
+        <p:nvPicPr>
+          <p:cNvPr id="8" name="Inhaltsplatzhalter 7">
+            <a:extLst>
+              <a:ext uri="{FF2B5EF4-FFF2-40B4-BE49-F238E27FC236}">
+                <a16:creationId xmlns:a16="http://schemas.microsoft.com/office/drawing/2014/main" xmlns="" id="{AC8FC20D-C4BB-4858-9AA7-67A6D2F24CB1}"/>
+              </a:ext>
+            </a:extLst>
+          </p:cNvPr>
+          <p:cNvPicPr>
+            <a:picLocks noGrp="1" noChangeAspect="1"/>
+          </p:cNvPicPr>
+          <p:nvPr>
+            <p:ph sz="half" idx="4294967295"/>
+          </p:nvPr>
+        </p:nvPicPr>
+        <p:blipFill rotWithShape="1">
+          <a:blip r:embed="rId3">
+            <a:extLst>
+              <a:ext uri="{28A0092B-C50C-407E-A947-70E740481C1C}">
+                <a14:useLocalDpi xmlns:a14="http://schemas.microsoft.com/office/drawing/2010/main" val="0"/>
+              </a:ext>
+            </a:extLst>
+          </a:blip>
+          <a:srcRect b="39910"/>
+          <a:stretch/>
+        </p:blipFill>
+        <p:spPr>
+          <a:xfrm>
+            <a:off x="1612232" y="1400368"/>
+            <a:ext cx="3457074" cy="5000445"/>
+          </a:xfrm>
+        </p:spPr>
+      </p:pic>
+      <p:sp>
+        <p:nvSpPr>
+          <p:cNvPr id="5" name="TextBox 4"/>
+          <p:cNvSpPr txBox="1"/>
+          <p:nvPr/>
+        </p:nvSpPr>
+        <p:spPr>
+          <a:xfrm>
+            <a:off x="874295" y="409075"/>
+            <a:ext cx="10483515" cy="646331"/>
+          </a:xfrm>
+          <a:prstGeom prst="rect">
+            <a:avLst/>
+          </a:prstGeom>
+          <a:noFill/>
+        </p:spPr>
+        <p:txBody>
+          <a:bodyPr wrap="square" rtlCol="0">
+            <a:spAutoFit/>
+          </a:bodyPr>
+          <a:lstStyle/>
+          <a:p>
+            <a:r>
+              <a:rPr lang="en-US" sz="3600" dirty="0">
+                <a:latin typeface="Calibri Light" panose="020F0302020204030204" pitchFamily="34" charset="0"/>
+                <a:cs typeface="Calibri Light" panose="020F0302020204030204" pitchFamily="34" charset="0"/>
+              </a:rPr>
+              <a:t>Two easiest solutions: mean and median meta digits</a:t>
+            </a:r>
+            <a:endParaRPr lang="ru-RU" sz="3600" dirty="0">
+              <a:latin typeface="Calibri Light" panose="020F0302020204030204" pitchFamily="34" charset="0"/>
+              <a:cs typeface="Calibri Light" panose="020F0302020204030204" pitchFamily="34" charset="0"/>
+            </a:endParaRPr>
+          </a:p>
+        </p:txBody>
+      </p:sp>
+    </p:spTree>
+    <p:extLst>
+      <p:ext uri="{BB962C8B-B14F-4D97-AF65-F5344CB8AC3E}">
+        <p14:creationId xmlns:p14="http://schemas.microsoft.com/office/powerpoint/2010/main" val="238965826"/>
+      </p:ext>
+    </p:extLst>
+  </p:cSld>
+  <p:clrMapOvr>
+    <a:masterClrMapping/>
+  </p:clrMapOvr>
+</p:sld>
+</file>
+
+<file path=ppt/slides/slide12.xml><?xml version="1.0" encoding="utf-8"?>
+<p:sld xmlns:a="http://schemas.openxmlformats.org/drawingml/2006/main" xmlns:r="http://schemas.openxmlformats.org/officeDocument/2006/relationships" xmlns:p="http://schemas.openxmlformats.org/presentationml/2006/main">
+  <p:cSld>
+    <p:spTree>
+      <p:nvGrpSpPr>
+        <p:cNvPr id="1" name=""/>
+        <p:cNvGrpSpPr/>
+        <p:nvPr/>
+      </p:nvGrpSpPr>
+      <p:grpSpPr>
+        <a:xfrm>
+          <a:off x="0" y="0"/>
+          <a:ext cx="0" cy="0"/>
+          <a:chOff x="0" y="0"/>
+          <a:chExt cx="0" cy="0"/>
+        </a:xfrm>
+      </p:grpSpPr>
       <p:sp>
         <p:nvSpPr>
           <p:cNvPr id="5" name="Titel 4">
             <a:extLst>
               <a:ext uri="{FF2B5EF4-FFF2-40B4-BE49-F238E27FC236}">
-                <a16:creationId xmlns:a16="http://schemas.microsoft.com/office/drawing/2014/main" id="{9222B4BD-52BA-4791-9651-98D4F0FB5A4A}"/>
+                <a16:creationId xmlns:a16="http://schemas.microsoft.com/office/drawing/2014/main" xmlns="" id="{9222B4BD-52BA-4791-9651-98D4F0FB5A4A}"/>
               </a:ext>
             </a:extLst>
           </p:cNvPr>
@@ -10102,7 +10512,7 @@
           <p:cNvPr id="6" name="Inhaltsplatzhalter 5">
             <a:extLst>
               <a:ext uri="{FF2B5EF4-FFF2-40B4-BE49-F238E27FC236}">
-                <a16:creationId xmlns:a16="http://schemas.microsoft.com/office/drawing/2014/main" id="{1A0911F2-B0B3-45D8-B92B-270F6D60CFB4}"/>
+                <a16:creationId xmlns:a16="http://schemas.microsoft.com/office/drawing/2014/main" xmlns="" id="{1A0911F2-B0B3-45D8-B92B-270F6D60CFB4}"/>
               </a:ext>
             </a:extLst>
           </p:cNvPr>
@@ -10115,114 +10525,283 @@
         </p:nvSpPr>
         <p:spPr>
           <a:xfrm>
-            <a:off x="1281764" y="2110430"/>
-            <a:ext cx="4937760" cy="4023359"/>
+            <a:off x="772357" y="2110430"/>
+            <a:ext cx="5885895" cy="4023359"/>
           </a:xfrm>
         </p:spPr>
         <p:txBody>
           <a:bodyPr/>
           <a:lstStyle/>
           <a:p>
-            <a:r>
-              <a:rPr lang="de-DE" dirty="0"/>
-              <a:t>Image </a:t>
-            </a:r>
-            <a:r>
-              <a:rPr lang="de-DE" dirty="0" err="1"/>
+            <a:pPr>
+              <a:buFont typeface="Arial" panose="020B0604020202020204" pitchFamily="34" charset="0"/>
+              <a:buChar char="•"/>
+            </a:pPr>
+            <a:r>
+              <a:rPr lang="de-DE" sz="2400" dirty="0" smtClean="0"/>
+              <a:t> Image </a:t>
+            </a:r>
+            <a:r>
+              <a:rPr lang="de-DE" sz="2400" dirty="0" err="1"/>
               <a:t>that</a:t>
             </a:r>
             <a:r>
-              <a:rPr lang="de-DE" dirty="0"/>
+              <a:rPr lang="de-DE" sz="2400" dirty="0"/>
               <a:t> </a:t>
             </a:r>
             <a:r>
-              <a:rPr lang="de-DE" dirty="0" err="1"/>
+              <a:rPr lang="de-DE" sz="2400" dirty="0" err="1"/>
               <a:t>is</a:t>
             </a:r>
             <a:r>
-              <a:rPr lang="de-DE" dirty="0"/>
+              <a:rPr lang="de-DE" sz="2400" dirty="0"/>
               <a:t> </a:t>
             </a:r>
             <a:r>
-              <a:rPr lang="de-DE" dirty="0" err="1"/>
+              <a:rPr lang="de-DE" sz="2400" dirty="0" err="1"/>
               <a:t>surrounded</a:t>
             </a:r>
             <a:r>
-              <a:rPr lang="de-DE" dirty="0"/>
+              <a:rPr lang="de-DE" sz="2400" dirty="0"/>
               <a:t> </a:t>
             </a:r>
             <a:r>
-              <a:rPr lang="de-DE" dirty="0" err="1"/>
+              <a:rPr lang="de-DE" sz="2400" dirty="0" err="1"/>
               <a:t>by</a:t>
             </a:r>
             <a:r>
-              <a:rPr lang="de-DE" dirty="0"/>
+              <a:rPr lang="de-DE" sz="2400" dirty="0"/>
               <a:t> </a:t>
             </a:r>
             <a:r>
-              <a:rPr lang="de-DE" dirty="0" err="1"/>
+              <a:rPr lang="de-DE" sz="2400" dirty="0" err="1"/>
               <a:t>the</a:t>
             </a:r>
             <a:r>
-              <a:rPr lang="de-DE" dirty="0"/>
+              <a:rPr lang="de-DE" sz="2400" dirty="0"/>
               <a:t> </a:t>
             </a:r>
             <a:r>
-              <a:rPr lang="de-DE" dirty="0" err="1"/>
+              <a:rPr lang="de-DE" sz="2400" dirty="0" err="1"/>
               <a:t>highest</a:t>
             </a:r>
             <a:r>
-              <a:rPr lang="de-DE" dirty="0"/>
+              <a:rPr lang="de-DE" sz="2400" dirty="0"/>
               <a:t> </a:t>
             </a:r>
             <a:r>
-              <a:rPr lang="de-DE" dirty="0" err="1"/>
+              <a:rPr lang="de-DE" sz="2400" dirty="0" err="1"/>
               <a:t>number</a:t>
             </a:r>
             <a:r>
-              <a:rPr lang="de-DE" dirty="0"/>
+              <a:rPr lang="de-DE" sz="2400" dirty="0"/>
               <a:t> </a:t>
             </a:r>
             <a:r>
-              <a:rPr lang="de-DE" dirty="0" err="1"/>
+              <a:rPr lang="de-DE" sz="2400" dirty="0" err="1"/>
               <a:t>of</a:t>
             </a:r>
             <a:r>
-              <a:rPr lang="de-DE" dirty="0"/>
+              <a:rPr lang="de-DE" sz="2400" dirty="0"/>
               <a:t> </a:t>
             </a:r>
             <a:r>
-              <a:rPr lang="de-DE" dirty="0" err="1"/>
+              <a:rPr lang="de-DE" sz="2400" dirty="0" err="1"/>
               <a:t>images</a:t>
             </a:r>
             <a:r>
-              <a:rPr lang="de-DE" dirty="0"/>
+              <a:rPr lang="de-DE" sz="2400" dirty="0"/>
               <a:t> </a:t>
             </a:r>
             <a:r>
-              <a:rPr lang="de-DE" dirty="0" err="1"/>
+              <a:rPr lang="de-DE" sz="2400" dirty="0" err="1"/>
               <a:t>with</a:t>
             </a:r>
             <a:r>
-              <a:rPr lang="de-DE" dirty="0"/>
+              <a:rPr lang="de-DE" sz="2400" dirty="0"/>
               <a:t> </a:t>
             </a:r>
             <a:r>
-              <a:rPr lang="de-DE" dirty="0" err="1"/>
+              <a:rPr lang="de-DE" sz="2400" dirty="0" err="1"/>
               <a:t>the</a:t>
             </a:r>
             <a:r>
-              <a:rPr lang="de-DE" dirty="0"/>
+              <a:rPr lang="de-DE" sz="2400" dirty="0"/>
               <a:t> same </a:t>
             </a:r>
             <a:r>
-              <a:rPr lang="de-DE" dirty="0" err="1"/>
+              <a:rPr lang="de-DE" sz="2400" dirty="0" err="1"/>
               <a:t>label</a:t>
             </a:r>
             <a:r>
-              <a:rPr lang="de-DE" dirty="0"/>
+              <a:rPr lang="de-DE" sz="2400" dirty="0" smtClean="0"/>
               <a:t>.</a:t>
             </a:r>
+          </a:p>
+          <a:p>
+            <a:pPr>
+              <a:buFont typeface="Arial" panose="020B0604020202020204" pitchFamily="34" charset="0"/>
+              <a:buChar char="•"/>
+            </a:pPr>
+            <a:r>
+              <a:rPr lang="de-DE" sz="2400" dirty="0" smtClean="0"/>
+              <a:t> </a:t>
+            </a:r>
+            <a:r>
+              <a:rPr lang="de-DE" sz="2400" dirty="0" err="1" smtClean="0"/>
+              <a:t>We</a:t>
+            </a:r>
+            <a:r>
+              <a:rPr lang="de-DE" sz="2400" dirty="0" smtClean="0"/>
+              <a:t> </a:t>
+            </a:r>
+            <a:r>
+              <a:rPr lang="de-DE" sz="2400" dirty="0" err="1" smtClean="0"/>
+              <a:t>decided</a:t>
+            </a:r>
+            <a:r>
+              <a:rPr lang="de-DE" sz="2400" dirty="0" smtClean="0"/>
+              <a:t> </a:t>
+            </a:r>
+            <a:r>
+              <a:rPr lang="de-DE" sz="2400" dirty="0" err="1" smtClean="0"/>
+              <a:t>to</a:t>
+            </a:r>
+            <a:r>
+              <a:rPr lang="de-DE" sz="2400" dirty="0" smtClean="0"/>
+              <a:t> </a:t>
+            </a:r>
+            <a:r>
+              <a:rPr lang="de-DE" sz="2400" dirty="0" err="1" smtClean="0"/>
+              <a:t>take</a:t>
+            </a:r>
+            <a:r>
+              <a:rPr lang="de-DE" sz="2400" dirty="0" smtClean="0"/>
+              <a:t> </a:t>
+            </a:r>
+            <a:r>
+              <a:rPr lang="de-DE" sz="2400" dirty="0" err="1" smtClean="0"/>
+              <a:t>it</a:t>
+            </a:r>
+            <a:r>
+              <a:rPr lang="de-DE" sz="2400" dirty="0" smtClean="0"/>
+              <a:t> </a:t>
+            </a:r>
+            <a:r>
+              <a:rPr lang="de-DE" sz="2400" dirty="0" err="1" smtClean="0"/>
+              <a:t>as</a:t>
+            </a:r>
+            <a:r>
+              <a:rPr lang="de-DE" sz="2400" dirty="0" smtClean="0"/>
+              <a:t> </a:t>
+            </a:r>
+            <a:r>
+              <a:rPr lang="de-DE" sz="2400" dirty="0" err="1" smtClean="0"/>
+              <a:t>meta</a:t>
+            </a:r>
+            <a:r>
+              <a:rPr lang="de-DE" sz="2400" dirty="0" smtClean="0"/>
+              <a:t> </a:t>
+            </a:r>
+            <a:r>
+              <a:rPr lang="de-DE" sz="2400" dirty="0" err="1" smtClean="0"/>
+              <a:t>digit</a:t>
+            </a:r>
+            <a:r>
+              <a:rPr lang="de-DE" sz="2400" dirty="0" smtClean="0"/>
+              <a:t>.</a:t>
+            </a:r>
+          </a:p>
+          <a:p>
+            <a:pPr>
+              <a:buFont typeface="Arial" panose="020B0604020202020204" pitchFamily="34" charset="0"/>
+              <a:buChar char="•"/>
+            </a:pPr>
+            <a:r>
+              <a:rPr lang="de-DE" sz="2400" dirty="0" smtClean="0"/>
+              <a:t> </a:t>
+            </a:r>
+            <a:r>
+              <a:rPr lang="de-DE" sz="2400" u="sng" dirty="0" err="1" smtClean="0"/>
+              <a:t>Reason</a:t>
+            </a:r>
+            <a:r>
+              <a:rPr lang="de-DE" sz="2400" dirty="0" smtClean="0"/>
+              <a:t>: </a:t>
+            </a:r>
+            <a:r>
+              <a:rPr lang="de-DE" sz="2400" dirty="0" err="1" smtClean="0"/>
+              <a:t>only</a:t>
+            </a:r>
+            <a:r>
+              <a:rPr lang="de-DE" sz="2400" dirty="0" smtClean="0"/>
+              <a:t> </a:t>
+            </a:r>
+            <a:r>
+              <a:rPr lang="de-DE" sz="2400" dirty="0" err="1" smtClean="0"/>
+              <a:t>this</a:t>
+            </a:r>
+            <a:r>
+              <a:rPr lang="de-DE" sz="2400" dirty="0" smtClean="0"/>
+              <a:t> </a:t>
+            </a:r>
+            <a:r>
+              <a:rPr lang="de-DE" sz="2400" dirty="0" err="1" smtClean="0"/>
+              <a:t>meta</a:t>
+            </a:r>
+            <a:r>
+              <a:rPr lang="de-DE" sz="2400" dirty="0" smtClean="0"/>
+              <a:t> </a:t>
+            </a:r>
+            <a:r>
+              <a:rPr lang="de-DE" sz="2400" dirty="0" err="1" smtClean="0"/>
+              <a:t>digit</a:t>
+            </a:r>
+            <a:r>
+              <a:rPr lang="de-DE" sz="2400" dirty="0" smtClean="0"/>
+              <a:t> type </a:t>
+            </a:r>
+            <a:r>
+              <a:rPr lang="de-DE" sz="2400" dirty="0" err="1" smtClean="0"/>
+              <a:t>represents</a:t>
+            </a:r>
+            <a:r>
+              <a:rPr lang="de-DE" sz="2400" dirty="0" smtClean="0"/>
+              <a:t> </a:t>
+            </a:r>
+            <a:r>
+              <a:rPr lang="de-DE" sz="2400" dirty="0" err="1" smtClean="0"/>
+              <a:t>the</a:t>
+            </a:r>
+            <a:r>
+              <a:rPr lang="de-DE" sz="2400" dirty="0" smtClean="0"/>
+              <a:t> real </a:t>
+            </a:r>
+            <a:r>
+              <a:rPr lang="de-DE" sz="2400" dirty="0" err="1" smtClean="0"/>
+              <a:t>existing</a:t>
+            </a:r>
+            <a:r>
+              <a:rPr lang="de-DE" sz="2400" dirty="0" smtClean="0"/>
+              <a:t> </a:t>
+            </a:r>
+            <a:r>
+              <a:rPr lang="de-DE" sz="2400" dirty="0" err="1" smtClean="0"/>
+              <a:t>data</a:t>
+            </a:r>
+            <a:r>
+              <a:rPr lang="de-DE" sz="2400" dirty="0" smtClean="0"/>
+              <a:t>-point (</a:t>
+            </a:r>
+            <a:r>
+              <a:rPr lang="de-DE" sz="2400" dirty="0" err="1" smtClean="0"/>
+              <a:t>image</a:t>
+            </a:r>
+            <a:r>
+              <a:rPr lang="de-DE" sz="2400" dirty="0" smtClean="0"/>
+              <a:t>)</a:t>
+            </a:r>
+            <a:endParaRPr lang="de-DE" sz="2400" dirty="0"/>
           </a:p>
           <a:p>
             <a:endParaRPr lang="de-DE" dirty="0"/>
@@ -10234,7 +10813,7 @@
           <p:cNvPr id="9" name="Inhaltsplatzhalter 8">
             <a:extLst>
               <a:ext uri="{FF2B5EF4-FFF2-40B4-BE49-F238E27FC236}">
-                <a16:creationId xmlns:a16="http://schemas.microsoft.com/office/drawing/2014/main" id="{9909C030-22D0-4734-9DCB-167BC6D672DF}"/>
+                <a16:creationId xmlns:a16="http://schemas.microsoft.com/office/drawing/2014/main" xmlns="" id="{9909C030-22D0-4734-9DCB-167BC6D672DF}"/>
               </a:ext>
             </a:extLst>
           </p:cNvPr>
@@ -10276,7 +10855,7 @@
 </p:sld>
 </file>
 
-<file path=ppt/slides/slide12.xml><?xml version="1.0" encoding="utf-8"?>
+<file path=ppt/slides/slide13.xml><?xml version="1.0" encoding="utf-8"?>
 <p:sld xmlns:a="http://schemas.openxmlformats.org/drawingml/2006/main" xmlns:r="http://schemas.openxmlformats.org/officeDocument/2006/relationships" xmlns:p="http://schemas.openxmlformats.org/presentationml/2006/main">
   <p:cSld>
     <p:spTree>
@@ -10298,7 +10877,7 @@
           <p:cNvPr id="5" name="Titel 4">
             <a:extLst>
               <a:ext uri="{FF2B5EF4-FFF2-40B4-BE49-F238E27FC236}">
-                <a16:creationId xmlns:a16="http://schemas.microsoft.com/office/drawing/2014/main" id="{CB372DEC-D0F9-4D40-9149-13D17AAF964B}"/>
+                <a16:creationId xmlns:a16="http://schemas.microsoft.com/office/drawing/2014/main" xmlns="" id="{CB372DEC-D0F9-4D40-9149-13D17AAF964B}"/>
               </a:ext>
             </a:extLst>
           </p:cNvPr>
@@ -10354,7 +10933,7 @@
           <p:cNvPr id="6" name="Untertitel 5">
             <a:extLst>
               <a:ext uri="{FF2B5EF4-FFF2-40B4-BE49-F238E27FC236}">
-                <a16:creationId xmlns:a16="http://schemas.microsoft.com/office/drawing/2014/main" id="{72729885-95AF-4E52-9DF2-73274144A388}"/>
+                <a16:creationId xmlns:a16="http://schemas.microsoft.com/office/drawing/2014/main" xmlns="" id="{72729885-95AF-4E52-9DF2-73274144A388}"/>
               </a:ext>
             </a:extLst>
           </p:cNvPr>
@@ -10387,7 +10966,7 @@
 </p:sld>
 </file>
 
-<file path=ppt/slides/slide13.xml><?xml version="1.0" encoding="utf-8"?>
+<file path=ppt/slides/slide14.xml><?xml version="1.0" encoding="utf-8"?>
 <p:sld xmlns:a="http://schemas.openxmlformats.org/drawingml/2006/main" xmlns:r="http://schemas.openxmlformats.org/officeDocument/2006/relationships" xmlns:p="http://schemas.openxmlformats.org/presentationml/2006/main">
   <p:cSld>
     <p:bg>
@@ -10417,10 +10996,10 @@
           <p:cNvPr id="10" name="Rectangle 9">
             <a:extLst>
               <a:ext uri="{FF2B5EF4-FFF2-40B4-BE49-F238E27FC236}">
-                <a16:creationId xmlns:a16="http://schemas.microsoft.com/office/drawing/2014/main" id="{D829E218-74FB-4455-98BE-F2C5BA8978BE}"/>
+                <a16:creationId xmlns:a16="http://schemas.microsoft.com/office/drawing/2014/main" xmlns="" id="{D829E218-74FB-4455-98BE-F2C5BA8978BE}"/>
               </a:ext>
               <a:ext uri="{C183D7F6-B498-43B3-948B-1728B52AA6E4}">
-                <adec:decorative xmlns:adec="http://schemas.microsoft.com/office/drawing/2017/decorative" val="1"/>
+                <adec:decorative xmlns:adec="http://schemas.microsoft.com/office/drawing/2017/decorative" xmlns="" val="1"/>
               </a:ext>
             </a:extLst>
           </p:cNvPr>
@@ -10430,7 +11009,7 @@
           <p:nvPr>
             <p:extLst>
               <p:ext uri="{386F3935-93C4-4BCD-93E2-E3B085C9AB24}">
-                <p16:designElem xmlns:p16="http://schemas.microsoft.com/office/powerpoint/2015/main" val="1"/>
+                <p16:designElem xmlns:p16="http://schemas.microsoft.com/office/powerpoint/2015/main" xmlns="" val="1"/>
               </p:ext>
             </p:extLst>
           </p:nvPr>
@@ -10472,10 +11051,10 @@
           <p:cNvPr id="12" name="Rectangle 11">
             <a:extLst>
               <a:ext uri="{FF2B5EF4-FFF2-40B4-BE49-F238E27FC236}">
-                <a16:creationId xmlns:a16="http://schemas.microsoft.com/office/drawing/2014/main" id="{7E8D75FD-D4F9-4D11-B70D-82EFCB4CFA5B}"/>
+                <a16:creationId xmlns:a16="http://schemas.microsoft.com/office/drawing/2014/main" xmlns="" id="{7E8D75FD-D4F9-4D11-B70D-82EFCB4CFA5B}"/>
               </a:ext>
               <a:ext uri="{C183D7F6-B498-43B3-948B-1728B52AA6E4}">
-                <adec:decorative xmlns:adec="http://schemas.microsoft.com/office/drawing/2017/decorative" val="1"/>
+                <adec:decorative xmlns:adec="http://schemas.microsoft.com/office/drawing/2017/decorative" xmlns="" val="1"/>
               </a:ext>
             </a:extLst>
           </p:cNvPr>
@@ -10485,7 +11064,7 @@
           <p:nvPr>
             <p:extLst>
               <p:ext uri="{386F3935-93C4-4BCD-93E2-E3B085C9AB24}">
-                <p16:designElem xmlns:p16="http://schemas.microsoft.com/office/powerpoint/2015/main" val="1"/>
+                <p16:designElem xmlns:p16="http://schemas.microsoft.com/office/powerpoint/2015/main" xmlns="" val="1"/>
               </p:ext>
             </p:extLst>
           </p:nvPr>
@@ -10527,10 +11106,10 @@
           <p:cNvPr id="14" name="Straight Connector 13">
             <a:extLst>
               <a:ext uri="{FF2B5EF4-FFF2-40B4-BE49-F238E27FC236}">
-                <a16:creationId xmlns:a16="http://schemas.microsoft.com/office/drawing/2014/main" id="{1F5DC8C3-BA5F-4EED-BB9A-A14272BD82A1}"/>
+                <a16:creationId xmlns:a16="http://schemas.microsoft.com/office/drawing/2014/main" xmlns="" id="{1F5DC8C3-BA5F-4EED-BB9A-A14272BD82A1}"/>
               </a:ext>
               <a:ext uri="{C183D7F6-B498-43B3-948B-1728B52AA6E4}">
-                <adec:decorative xmlns:adec="http://schemas.microsoft.com/office/drawing/2017/decorative" val="1"/>
+                <adec:decorative xmlns:adec="http://schemas.microsoft.com/office/drawing/2017/decorative" xmlns="" val="1"/>
               </a:ext>
             </a:extLst>
           </p:cNvPr>
@@ -10540,7 +11119,7 @@
           <p:nvPr>
             <p:extLst>
               <p:ext uri="{386F3935-93C4-4BCD-93E2-E3B085C9AB24}">
-                <p16:designElem xmlns:p16="http://schemas.microsoft.com/office/powerpoint/2015/main" val="1"/>
+                <p16:designElem xmlns:p16="http://schemas.microsoft.com/office/powerpoint/2015/main" xmlns="" val="1"/>
               </p:ext>
             </p:extLst>
           </p:nvPr>
@@ -10582,10 +11161,10 @@
           <p:cNvPr id="16" name="Rectangle 15">
             <a:extLst>
               <a:ext uri="{FF2B5EF4-FFF2-40B4-BE49-F238E27FC236}">
-                <a16:creationId xmlns:a16="http://schemas.microsoft.com/office/drawing/2014/main" id="{8638A98B-4B4B-4607-B11F-7DCA0D7CCE17}"/>
+                <a16:creationId xmlns:a16="http://schemas.microsoft.com/office/drawing/2014/main" xmlns="" id="{8638A98B-4B4B-4607-B11F-7DCA0D7CCE17}"/>
               </a:ext>
               <a:ext uri="{C183D7F6-B498-43B3-948B-1728B52AA6E4}">
-                <adec:decorative xmlns:adec="http://schemas.microsoft.com/office/drawing/2017/decorative" val="1"/>
+                <adec:decorative xmlns:adec="http://schemas.microsoft.com/office/drawing/2017/decorative" xmlns="" val="1"/>
               </a:ext>
             </a:extLst>
           </p:cNvPr>
@@ -10595,7 +11174,7 @@
           <p:nvPr>
             <p:extLst>
               <p:ext uri="{386F3935-93C4-4BCD-93E2-E3B085C9AB24}">
-                <p16:designElem xmlns:p16="http://schemas.microsoft.com/office/powerpoint/2015/main" val="1"/>
+                <p16:designElem xmlns:p16="http://schemas.microsoft.com/office/powerpoint/2015/main" xmlns="" val="1"/>
               </p:ext>
             </p:extLst>
           </p:nvPr>
@@ -10642,7 +11221,7 @@
           <p:cNvPr id="5" name="Inhaltsplatzhalter 4">
             <a:extLst>
               <a:ext uri="{FF2B5EF4-FFF2-40B4-BE49-F238E27FC236}">
-                <a16:creationId xmlns:a16="http://schemas.microsoft.com/office/drawing/2014/main" id="{0F908B00-977C-447A-87EE-7A00C164B759}"/>
+                <a16:creationId xmlns:a16="http://schemas.microsoft.com/office/drawing/2014/main" xmlns="" id="{0F908B00-977C-447A-87EE-7A00C164B759}"/>
               </a:ext>
             </a:extLst>
           </p:cNvPr>
@@ -10679,10 +11258,10 @@
           <p:cNvPr id="18" name="Rectangle 17">
             <a:extLst>
               <a:ext uri="{FF2B5EF4-FFF2-40B4-BE49-F238E27FC236}">
-                <a16:creationId xmlns:a16="http://schemas.microsoft.com/office/drawing/2014/main" id="{8E3B9B0E-204E-4BFD-B58A-E71D9CDC37F3}"/>
+                <a16:creationId xmlns:a16="http://schemas.microsoft.com/office/drawing/2014/main" xmlns="" id="{8E3B9B0E-204E-4BFD-B58A-E71D9CDC37F3}"/>
               </a:ext>
               <a:ext uri="{C183D7F6-B498-43B3-948B-1728B52AA6E4}">
-                <adec:decorative xmlns:adec="http://schemas.microsoft.com/office/drawing/2017/decorative" val="1"/>
+                <adec:decorative xmlns:adec="http://schemas.microsoft.com/office/drawing/2017/decorative" xmlns="" val="1"/>
               </a:ext>
             </a:extLst>
           </p:cNvPr>
@@ -10692,7 +11271,7 @@
           <p:nvPr>
             <p:extLst>
               <p:ext uri="{386F3935-93C4-4BCD-93E2-E3B085C9AB24}">
-                <p16:designElem xmlns:p16="http://schemas.microsoft.com/office/powerpoint/2015/main" val="1"/>
+                <p16:designElem xmlns:p16="http://schemas.microsoft.com/office/powerpoint/2015/main" xmlns="" val="1"/>
               </p:ext>
             </p:extLst>
           </p:nvPr>
@@ -10734,7 +11313,7 @@
           <p:cNvPr id="2" name="Titel 1">
             <a:extLst>
               <a:ext uri="{FF2B5EF4-FFF2-40B4-BE49-F238E27FC236}">
-                <a16:creationId xmlns:a16="http://schemas.microsoft.com/office/drawing/2014/main" id="{E21935D6-F135-4DD2-A417-738E067D86CB}"/>
+                <a16:creationId xmlns:a16="http://schemas.microsoft.com/office/drawing/2014/main" xmlns="" id="{E21935D6-F135-4DD2-A417-738E067D86CB}"/>
               </a:ext>
             </a:extLst>
           </p:cNvPr>
@@ -10781,10 +11360,10 @@
           <p:cNvPr id="20" name="Rectangle 19">
             <a:extLst>
               <a:ext uri="{FF2B5EF4-FFF2-40B4-BE49-F238E27FC236}">
-                <a16:creationId xmlns:a16="http://schemas.microsoft.com/office/drawing/2014/main" id="{B1121E64-CB88-4BF5-B531-C0316E7F6E30}"/>
+                <a16:creationId xmlns:a16="http://schemas.microsoft.com/office/drawing/2014/main" xmlns="" id="{B1121E64-CB88-4BF5-B531-C0316E7F6E30}"/>
               </a:ext>
               <a:ext uri="{C183D7F6-B498-43B3-948B-1728B52AA6E4}">
-                <adec:decorative xmlns:adec="http://schemas.microsoft.com/office/drawing/2017/decorative" val="1"/>
+                <adec:decorative xmlns:adec="http://schemas.microsoft.com/office/drawing/2017/decorative" xmlns="" val="1"/>
               </a:ext>
             </a:extLst>
           </p:cNvPr>
@@ -10794,7 +11373,7 @@
           <p:nvPr>
             <p:extLst>
               <p:ext uri="{386F3935-93C4-4BCD-93E2-E3B085C9AB24}">
-                <p16:designElem xmlns:p16="http://schemas.microsoft.com/office/powerpoint/2015/main" val="1"/>
+                <p16:designElem xmlns:p16="http://schemas.microsoft.com/office/powerpoint/2015/main" xmlns="" val="1"/>
               </p:ext>
             </p:extLst>
           </p:nvPr>
@@ -10844,7 +11423,7 @@
 </p:sld>
 </file>
 
-<file path=ppt/slides/slide14.xml><?xml version="1.0" encoding="utf-8"?>
+<file path=ppt/slides/slide15.xml><?xml version="1.0" encoding="utf-8"?>
 <p:sld xmlns:a="http://schemas.openxmlformats.org/drawingml/2006/main" xmlns:r="http://schemas.openxmlformats.org/officeDocument/2006/relationships" xmlns:p="http://schemas.openxmlformats.org/presentationml/2006/main">
   <p:cSld>
     <p:bg>
@@ -10874,10 +11453,10 @@
           <p:cNvPr id="13" name="Rectangle 12">
             <a:extLst>
               <a:ext uri="{FF2B5EF4-FFF2-40B4-BE49-F238E27FC236}">
-                <a16:creationId xmlns:a16="http://schemas.microsoft.com/office/drawing/2014/main" id="{0AB6E427-3F73-4C06-A5D5-AE52C3883B50}"/>
+                <a16:creationId xmlns:a16="http://schemas.microsoft.com/office/drawing/2014/main" xmlns="" id="{0AB6E427-3F73-4C06-A5D5-AE52C3883B50}"/>
               </a:ext>
               <a:ext uri="{C183D7F6-B498-43B3-948B-1728B52AA6E4}">
-                <adec:decorative xmlns:adec="http://schemas.microsoft.com/office/drawing/2017/decorative" val="1"/>
+                <adec:decorative xmlns:adec="http://schemas.microsoft.com/office/drawing/2017/decorative" xmlns="" val="1"/>
               </a:ext>
             </a:extLst>
           </p:cNvPr>
@@ -10887,7 +11466,7 @@
           <p:nvPr>
             <p:extLst>
               <p:ext uri="{386F3935-93C4-4BCD-93E2-E3B085C9AB24}">
-                <p16:designElem xmlns:p16="http://schemas.microsoft.com/office/powerpoint/2015/main" val="1"/>
+                <p16:designElem xmlns:p16="http://schemas.microsoft.com/office/powerpoint/2015/main" xmlns="" val="1"/>
               </p:ext>
             </p:extLst>
           </p:nvPr>
@@ -10934,10 +11513,10 @@
           <p:cNvPr id="15" name="Rectangle 14">
             <a:extLst>
               <a:ext uri="{FF2B5EF4-FFF2-40B4-BE49-F238E27FC236}">
-                <a16:creationId xmlns:a16="http://schemas.microsoft.com/office/drawing/2014/main" id="{D8C9BDAA-0390-4B39-9B5C-BC95E5120DA4}"/>
+                <a16:creationId xmlns:a16="http://schemas.microsoft.com/office/drawing/2014/main" xmlns="" id="{D8C9BDAA-0390-4B39-9B5C-BC95E5120DA4}"/>
               </a:ext>
               <a:ext uri="{C183D7F6-B498-43B3-948B-1728B52AA6E4}">
-                <adec:decorative xmlns:adec="http://schemas.microsoft.com/office/drawing/2017/decorative" val="1"/>
+                <adec:decorative xmlns:adec="http://schemas.microsoft.com/office/drawing/2017/decorative" xmlns="" val="1"/>
               </a:ext>
             </a:extLst>
           </p:cNvPr>
@@ -10947,7 +11526,7 @@
           <p:nvPr>
             <p:extLst>
               <p:ext uri="{386F3935-93C4-4BCD-93E2-E3B085C9AB24}">
-                <p16:designElem xmlns:p16="http://schemas.microsoft.com/office/powerpoint/2015/main" val="1"/>
+                <p16:designElem xmlns:p16="http://schemas.microsoft.com/office/powerpoint/2015/main" xmlns="" val="1"/>
               </p:ext>
             </p:extLst>
           </p:nvPr>
@@ -10989,7 +11568,7 @@
           <p:cNvPr id="2" name="Titel 1">
             <a:extLst>
               <a:ext uri="{FF2B5EF4-FFF2-40B4-BE49-F238E27FC236}">
-                <a16:creationId xmlns:a16="http://schemas.microsoft.com/office/drawing/2014/main" id="{D9FC22E7-D4D8-40F3-851D-F5CDDD673BBB}"/>
+                <a16:creationId xmlns:a16="http://schemas.microsoft.com/office/drawing/2014/main" xmlns="" id="{D9FC22E7-D4D8-40F3-851D-F5CDDD673BBB}"/>
               </a:ext>
             </a:extLst>
           </p:cNvPr>
@@ -11065,10 +11644,10 @@
           <p:cNvPr id="17" name="Rectangle 16">
             <a:extLst>
               <a:ext uri="{FF2B5EF4-FFF2-40B4-BE49-F238E27FC236}">
-                <a16:creationId xmlns:a16="http://schemas.microsoft.com/office/drawing/2014/main" id="{F9DB1FE5-9D46-433B-99D1-2F1B8DC79855}"/>
+                <a16:creationId xmlns:a16="http://schemas.microsoft.com/office/drawing/2014/main" xmlns="" id="{F9DB1FE5-9D46-433B-99D1-2F1B8DC79855}"/>
               </a:ext>
               <a:ext uri="{C183D7F6-B498-43B3-948B-1728B52AA6E4}">
-                <adec:decorative xmlns:adec="http://schemas.microsoft.com/office/drawing/2017/decorative" val="1"/>
+                <adec:decorative xmlns:adec="http://schemas.microsoft.com/office/drawing/2017/decorative" xmlns="" val="1"/>
               </a:ext>
             </a:extLst>
           </p:cNvPr>
@@ -11078,7 +11657,7 @@
           <p:nvPr>
             <p:extLst>
               <p:ext uri="{386F3935-93C4-4BCD-93E2-E3B085C9AB24}">
-                <p16:designElem xmlns:p16="http://schemas.microsoft.com/office/powerpoint/2015/main" val="1"/>
+                <p16:designElem xmlns:p16="http://schemas.microsoft.com/office/powerpoint/2015/main" xmlns="" val="1"/>
               </p:ext>
             </p:extLst>
           </p:nvPr>
@@ -11120,7 +11699,7 @@
           <p:cNvPr id="8" name="Inhaltsplatzhalter 4">
             <a:extLst>
               <a:ext uri="{FF2B5EF4-FFF2-40B4-BE49-F238E27FC236}">
-                <a16:creationId xmlns:a16="http://schemas.microsoft.com/office/drawing/2014/main" id="{505EAB39-71B6-4CDF-BAE8-6F62F743A0C5}"/>
+                <a16:creationId xmlns:a16="http://schemas.microsoft.com/office/drawing/2014/main" xmlns="" id="{505EAB39-71B6-4CDF-BAE8-6F62F743A0C5}"/>
               </a:ext>
             </a:extLst>
           </p:cNvPr>
@@ -11156,7 +11735,7 @@
           <p:cNvPr id="9" name="Flussdiagramm: Verbinder 8">
             <a:extLst>
               <a:ext uri="{FF2B5EF4-FFF2-40B4-BE49-F238E27FC236}">
-                <a16:creationId xmlns:a16="http://schemas.microsoft.com/office/drawing/2014/main" id="{01F5D49F-8D20-4DA3-86D3-7FA5F8AD94CD}"/>
+                <a16:creationId xmlns:a16="http://schemas.microsoft.com/office/drawing/2014/main" xmlns="" id="{01F5D49F-8D20-4DA3-86D3-7FA5F8AD94CD}"/>
               </a:ext>
             </a:extLst>
           </p:cNvPr>
@@ -11208,7 +11787,7 @@
           <p:cNvPr id="7" name="Inhaltsplatzhalter 6" descr="Fragen">
             <a:extLst>
               <a:ext uri="{FF2B5EF4-FFF2-40B4-BE49-F238E27FC236}">
-                <a16:creationId xmlns:a16="http://schemas.microsoft.com/office/drawing/2014/main" id="{BB4769F3-A84A-45E1-9A4D-9E984E568AC4}"/>
+                <a16:creationId xmlns:a16="http://schemas.microsoft.com/office/drawing/2014/main" xmlns="" id="{BB4769F3-A84A-45E1-9A4D-9E984E568AC4}"/>
               </a:ext>
             </a:extLst>
           </p:cNvPr>
@@ -11226,7 +11805,7 @@
                 <a14:useLocalDpi xmlns:a14="http://schemas.microsoft.com/office/drawing/2010/main" val="0"/>
               </a:ext>
               <a:ext uri="{96DAC541-7B7A-43D3-8B79-37D633B846F1}">
-                <asvg:svgBlip xmlns:asvg="http://schemas.microsoft.com/office/drawing/2016/SVG/main" r:embed="rId4"/>
+                <asvg:svgBlip xmlns:asvg="http://schemas.microsoft.com/office/drawing/2016/SVG/main" xmlns="" r:embed="rId4"/>
               </a:ext>
             </a:extLst>
           </a:blip>
@@ -11439,7 +12018,7 @@
 </p:sld>
 </file>
 
-<file path=ppt/slides/slide15.xml><?xml version="1.0" encoding="utf-8"?>
+<file path=ppt/slides/slide16.xml><?xml version="1.0" encoding="utf-8"?>
 <p:sld xmlns:a="http://schemas.openxmlformats.org/drawingml/2006/main" xmlns:r="http://schemas.openxmlformats.org/officeDocument/2006/relationships" xmlns:p="http://schemas.openxmlformats.org/presentationml/2006/main">
   <p:cSld>
     <p:spTree>
@@ -11458,10 +12037,170 @@
       </p:grpSpPr>
       <p:sp>
         <p:nvSpPr>
+          <p:cNvPr id="2" name="Заголовок 1"/>
+          <p:cNvSpPr>
+            <a:spLocks noGrp="1"/>
+          </p:cNvSpPr>
+          <p:nvPr>
+            <p:ph type="title"/>
+          </p:nvPr>
+        </p:nvSpPr>
+        <p:spPr/>
+        <p:txBody>
+          <a:bodyPr/>
+          <a:lstStyle/>
+          <a:p>
+            <a:r>
+              <a:rPr lang="en-US" dirty="0" smtClean="0"/>
+              <a:t>Exciting things to be investigated</a:t>
+            </a:r>
+            <a:endParaRPr lang="ru-RU" dirty="0"/>
+          </a:p>
+        </p:txBody>
+      </p:sp>
+      <p:sp>
+        <p:nvSpPr>
+          <p:cNvPr id="5" name="TextBox 4"/>
+          <p:cNvSpPr txBox="1"/>
+          <p:nvPr/>
+        </p:nvSpPr>
+        <p:spPr>
+          <a:xfrm>
+            <a:off x="1091953" y="2041864"/>
+            <a:ext cx="10395752" cy="2585323"/>
+          </a:xfrm>
+          <a:prstGeom prst="rect">
+            <a:avLst/>
+          </a:prstGeom>
+          <a:noFill/>
+        </p:spPr>
+        <p:txBody>
+          <a:bodyPr wrap="square" rtlCol="0">
+            <a:spAutoFit/>
+          </a:bodyPr>
+          <a:lstStyle/>
+          <a:p>
+            <a:pPr marL="285750" indent="-285750">
+              <a:buFont typeface="Arial" panose="020B0604020202020204" pitchFamily="34" charset="0"/>
+              <a:buChar char="•"/>
+            </a:pPr>
+            <a:r>
+              <a:rPr lang="en-US" dirty="0" smtClean="0"/>
+              <a:t>Digits tree and </a:t>
+            </a:r>
+            <a:r>
+              <a:rPr lang="en-US" dirty="0" err="1" smtClean="0"/>
+              <a:t>cumulativity</a:t>
+            </a:r>
+            <a:r>
+              <a:rPr lang="en-US" dirty="0" smtClean="0"/>
+              <a:t> in prediction accuracy for a certain digit or even data-point</a:t>
+            </a:r>
+          </a:p>
+          <a:p>
+            <a:endParaRPr lang="en-US" dirty="0" smtClean="0"/>
+          </a:p>
+          <a:p>
+            <a:pPr marL="285750" indent="-285750">
+              <a:buFont typeface="Arial" panose="020B0604020202020204" pitchFamily="34" charset="0"/>
+              <a:buChar char="•"/>
+            </a:pPr>
+            <a:r>
+              <a:rPr lang="en-US" dirty="0" smtClean="0"/>
+              <a:t>Which digits have higher average noise component (recognized better by  78 than by 784)</a:t>
+            </a:r>
+          </a:p>
+          <a:p>
+            <a:pPr marL="285750" indent="-285750">
+              <a:buFont typeface="Arial" panose="020B0604020202020204" pitchFamily="34" charset="0"/>
+              <a:buChar char="•"/>
+            </a:pPr>
+            <a:endParaRPr lang="en-US" dirty="0">
+              <a:solidFill>
+                <a:srgbClr val="FF0000"/>
+              </a:solidFill>
+            </a:endParaRPr>
+          </a:p>
+          <a:p>
+            <a:pPr marL="285750" indent="-285750">
+              <a:buFont typeface="Arial" panose="020B0604020202020204" pitchFamily="34" charset="0"/>
+              <a:buChar char="•"/>
+            </a:pPr>
+            <a:r>
+              <a:rPr lang="en-US" dirty="0" smtClean="0">
+                <a:solidFill>
+                  <a:srgbClr val="FF0000"/>
+                </a:solidFill>
+              </a:rPr>
+              <a:t>??????????????????????????????</a:t>
+            </a:r>
+          </a:p>
+          <a:p>
+            <a:pPr marL="285750" indent="-285750">
+              <a:buFont typeface="Arial" panose="020B0604020202020204" pitchFamily="34" charset="0"/>
+              <a:buChar char="•"/>
+            </a:pPr>
+            <a:endParaRPr lang="en-US" dirty="0"/>
+          </a:p>
+          <a:p>
+            <a:pPr marL="285750" indent="-285750">
+              <a:buFont typeface="Arial" panose="020B0604020202020204" pitchFamily="34" charset="0"/>
+              <a:buChar char="•"/>
+            </a:pPr>
+            <a:endParaRPr lang="en-US" dirty="0" smtClean="0"/>
+          </a:p>
+          <a:p>
+            <a:pPr marL="285750" indent="-285750">
+              <a:buFont typeface="Arial" panose="020B0604020202020204" pitchFamily="34" charset="0"/>
+              <a:buChar char="•"/>
+            </a:pPr>
+            <a:endParaRPr lang="en-US" dirty="0"/>
+          </a:p>
+          <a:p>
+            <a:pPr marL="285750" indent="-285750">
+              <a:buFont typeface="Arial" panose="020B0604020202020204" pitchFamily="34" charset="0"/>
+              <a:buChar char="•"/>
+            </a:pPr>
+            <a:endParaRPr lang="ru-RU" dirty="0"/>
+          </a:p>
+        </p:txBody>
+      </p:sp>
+    </p:spTree>
+    <p:extLst>
+      <p:ext uri="{BB962C8B-B14F-4D97-AF65-F5344CB8AC3E}">
+        <p14:creationId xmlns:p14="http://schemas.microsoft.com/office/powerpoint/2010/main" val="2509494485"/>
+      </p:ext>
+    </p:extLst>
+  </p:cSld>
+  <p:clrMapOvr>
+    <a:masterClrMapping/>
+  </p:clrMapOvr>
+</p:sld>
+</file>
+
+<file path=ppt/slides/slide17.xml><?xml version="1.0" encoding="utf-8"?>
+<p:sld xmlns:a="http://schemas.openxmlformats.org/drawingml/2006/main" xmlns:r="http://schemas.openxmlformats.org/officeDocument/2006/relationships" xmlns:p="http://schemas.openxmlformats.org/presentationml/2006/main">
+  <p:cSld>
+    <p:spTree>
+      <p:nvGrpSpPr>
+        <p:cNvPr id="1" name=""/>
+        <p:cNvGrpSpPr/>
+        <p:nvPr/>
+      </p:nvGrpSpPr>
+      <p:grpSpPr>
+        <a:xfrm>
+          <a:off x="0" y="0"/>
+          <a:ext cx="0" cy="0"/>
+          <a:chOff x="0" y="0"/>
+          <a:chExt cx="0" cy="0"/>
+        </a:xfrm>
+      </p:grpSpPr>
+      <p:sp>
+        <p:nvSpPr>
           <p:cNvPr id="4" name="Titel 3">
             <a:extLst>
               <a:ext uri="{FF2B5EF4-FFF2-40B4-BE49-F238E27FC236}">
-                <a16:creationId xmlns:a16="http://schemas.microsoft.com/office/drawing/2014/main" id="{80A7F226-CA13-4B8D-B6F9-57842DF36DC8}"/>
+                <a16:creationId xmlns:a16="http://schemas.microsoft.com/office/drawing/2014/main" xmlns="" id="{80A7F226-CA13-4B8D-B6F9-57842DF36DC8}"/>
               </a:ext>
             </a:extLst>
           </p:cNvPr>
@@ -11489,7 +12228,7 @@
           <p:cNvPr id="5" name="Untertitel 4">
             <a:extLst>
               <a:ext uri="{FF2B5EF4-FFF2-40B4-BE49-F238E27FC236}">
-                <a16:creationId xmlns:a16="http://schemas.microsoft.com/office/drawing/2014/main" id="{293A100A-CA18-49A1-8835-38E443666125}"/>
+                <a16:creationId xmlns:a16="http://schemas.microsoft.com/office/drawing/2014/main" xmlns="" id="{293A100A-CA18-49A1-8835-38E443666125}"/>
               </a:ext>
             </a:extLst>
           </p:cNvPr>
@@ -11544,7 +12283,7 @@
           <p:cNvPr id="2" name="Titel 1">
             <a:extLst>
               <a:ext uri="{FF2B5EF4-FFF2-40B4-BE49-F238E27FC236}">
-                <a16:creationId xmlns:a16="http://schemas.microsoft.com/office/drawing/2014/main" id="{5CD34B0C-C4AB-4E9E-933D-FCEFA5F7386A}"/>
+                <a16:creationId xmlns:a16="http://schemas.microsoft.com/office/drawing/2014/main" xmlns="" id="{5CD34B0C-C4AB-4E9E-933D-FCEFA5F7386A}"/>
               </a:ext>
             </a:extLst>
           </p:cNvPr>
@@ -12011,7 +12750,7 @@
           <p:cNvPr id="2" name="Titel 1">
             <a:extLst>
               <a:ext uri="{FF2B5EF4-FFF2-40B4-BE49-F238E27FC236}">
-                <a16:creationId xmlns:a16="http://schemas.microsoft.com/office/drawing/2014/main" id="{DE62BF7E-ADBC-4B3B-8BAB-95D01E311AED}"/>
+                <a16:creationId xmlns:a16="http://schemas.microsoft.com/office/drawing/2014/main" xmlns="" id="{DE62BF7E-ADBC-4B3B-8BAB-95D01E311AED}"/>
               </a:ext>
             </a:extLst>
           </p:cNvPr>
@@ -12055,7 +12794,7 @@
           <p:cNvPr id="8" name="Gerade Verbindung mit Pfeil 7">
             <a:extLst>
               <a:ext uri="{FF2B5EF4-FFF2-40B4-BE49-F238E27FC236}">
-                <a16:creationId xmlns:a16="http://schemas.microsoft.com/office/drawing/2014/main" id="{A79B7D31-8930-4A5A-AA1C-06892CC18291}"/>
+                <a16:creationId xmlns:a16="http://schemas.microsoft.com/office/drawing/2014/main" xmlns="" id="{A79B7D31-8930-4A5A-AA1C-06892CC18291}"/>
               </a:ext>
             </a:extLst>
           </p:cNvPr>
@@ -12096,7 +12835,7 @@
           <p:cNvPr id="11" name="Gerade Verbindung mit Pfeil 10">
             <a:extLst>
               <a:ext uri="{FF2B5EF4-FFF2-40B4-BE49-F238E27FC236}">
-                <a16:creationId xmlns:a16="http://schemas.microsoft.com/office/drawing/2014/main" id="{193B10F6-7A53-474E-BC21-C9DDCDE704C0}"/>
+                <a16:creationId xmlns:a16="http://schemas.microsoft.com/office/drawing/2014/main" xmlns="" id="{193B10F6-7A53-474E-BC21-C9DDCDE704C0}"/>
               </a:ext>
             </a:extLst>
           </p:cNvPr>
@@ -12137,7 +12876,7 @@
           <p:cNvPr id="13" name="Ellipse 12">
             <a:extLst>
               <a:ext uri="{FF2B5EF4-FFF2-40B4-BE49-F238E27FC236}">
-                <a16:creationId xmlns:a16="http://schemas.microsoft.com/office/drawing/2014/main" id="{7469256C-C83A-4F95-96CA-1818F8942C6D}"/>
+                <a16:creationId xmlns:a16="http://schemas.microsoft.com/office/drawing/2014/main" xmlns="" id="{7469256C-C83A-4F95-96CA-1818F8942C6D}"/>
               </a:ext>
             </a:extLst>
           </p:cNvPr>
@@ -12183,7 +12922,7 @@
           <p:cNvPr id="14" name="Ellipse 13">
             <a:extLst>
               <a:ext uri="{FF2B5EF4-FFF2-40B4-BE49-F238E27FC236}">
-                <a16:creationId xmlns:a16="http://schemas.microsoft.com/office/drawing/2014/main" id="{FC6EE53D-2964-4925-B51C-31D899033BB5}"/>
+                <a16:creationId xmlns:a16="http://schemas.microsoft.com/office/drawing/2014/main" xmlns="" id="{FC6EE53D-2964-4925-B51C-31D899033BB5}"/>
               </a:ext>
             </a:extLst>
           </p:cNvPr>
@@ -12229,7 +12968,7 @@
           <p:cNvPr id="15" name="Ellipse 14">
             <a:extLst>
               <a:ext uri="{FF2B5EF4-FFF2-40B4-BE49-F238E27FC236}">
-                <a16:creationId xmlns:a16="http://schemas.microsoft.com/office/drawing/2014/main" id="{58ADDE1C-EA42-455F-8EA6-B8E3BAE0272F}"/>
+                <a16:creationId xmlns:a16="http://schemas.microsoft.com/office/drawing/2014/main" xmlns="" id="{58ADDE1C-EA42-455F-8EA6-B8E3BAE0272F}"/>
               </a:ext>
             </a:extLst>
           </p:cNvPr>
@@ -12275,7 +13014,7 @@
           <p:cNvPr id="16" name="Ellipse 15">
             <a:extLst>
               <a:ext uri="{FF2B5EF4-FFF2-40B4-BE49-F238E27FC236}">
-                <a16:creationId xmlns:a16="http://schemas.microsoft.com/office/drawing/2014/main" id="{896F73C8-8F04-4CC6-97C4-1DD7B5E41760}"/>
+                <a16:creationId xmlns:a16="http://schemas.microsoft.com/office/drawing/2014/main" xmlns="" id="{896F73C8-8F04-4CC6-97C4-1DD7B5E41760}"/>
               </a:ext>
             </a:extLst>
           </p:cNvPr>
@@ -12321,7 +13060,7 @@
           <p:cNvPr id="17" name="Ellipse 16">
             <a:extLst>
               <a:ext uri="{FF2B5EF4-FFF2-40B4-BE49-F238E27FC236}">
-                <a16:creationId xmlns:a16="http://schemas.microsoft.com/office/drawing/2014/main" id="{E834ED1C-E0F9-4D80-BC22-E8D5FF875936}"/>
+                <a16:creationId xmlns:a16="http://schemas.microsoft.com/office/drawing/2014/main" xmlns="" id="{E834ED1C-E0F9-4D80-BC22-E8D5FF875936}"/>
               </a:ext>
             </a:extLst>
           </p:cNvPr>
@@ -12375,7 +13114,7 @@
           <p:cNvPr id="18" name="Ellipse 17">
             <a:extLst>
               <a:ext uri="{FF2B5EF4-FFF2-40B4-BE49-F238E27FC236}">
-                <a16:creationId xmlns:a16="http://schemas.microsoft.com/office/drawing/2014/main" id="{D9C9DB88-0D38-44B0-8D62-510C1934DB2C}"/>
+                <a16:creationId xmlns:a16="http://schemas.microsoft.com/office/drawing/2014/main" xmlns="" id="{D9C9DB88-0D38-44B0-8D62-510C1934DB2C}"/>
               </a:ext>
             </a:extLst>
           </p:cNvPr>
@@ -12429,7 +13168,7 @@
           <p:cNvPr id="19" name="Ellipse 18">
             <a:extLst>
               <a:ext uri="{FF2B5EF4-FFF2-40B4-BE49-F238E27FC236}">
-                <a16:creationId xmlns:a16="http://schemas.microsoft.com/office/drawing/2014/main" id="{AF5D232C-9B44-46DD-9434-43BE9D322187}"/>
+                <a16:creationId xmlns:a16="http://schemas.microsoft.com/office/drawing/2014/main" xmlns="" id="{AF5D232C-9B44-46DD-9434-43BE9D322187}"/>
               </a:ext>
             </a:extLst>
           </p:cNvPr>
@@ -12483,7 +13222,7 @@
           <p:cNvPr id="20" name="Ellipse 19">
             <a:extLst>
               <a:ext uri="{FF2B5EF4-FFF2-40B4-BE49-F238E27FC236}">
-                <a16:creationId xmlns:a16="http://schemas.microsoft.com/office/drawing/2014/main" id="{7DBB5383-166E-4F55-B5DA-3A43707886C8}"/>
+                <a16:creationId xmlns:a16="http://schemas.microsoft.com/office/drawing/2014/main" xmlns="" id="{7DBB5383-166E-4F55-B5DA-3A43707886C8}"/>
               </a:ext>
             </a:extLst>
           </p:cNvPr>
@@ -12537,7 +13276,7 @@
           <p:cNvPr id="21" name="Rechteck 20">
             <a:extLst>
               <a:ext uri="{FF2B5EF4-FFF2-40B4-BE49-F238E27FC236}">
-                <a16:creationId xmlns:a16="http://schemas.microsoft.com/office/drawing/2014/main" id="{557170D4-743C-4500-AC84-115677CC29C7}"/>
+                <a16:creationId xmlns:a16="http://schemas.microsoft.com/office/drawing/2014/main" xmlns="" id="{557170D4-743C-4500-AC84-115677CC29C7}"/>
               </a:ext>
             </a:extLst>
           </p:cNvPr>
@@ -12584,7 +13323,7 @@
           <p:cNvPr id="22" name="Rechteck 21">
             <a:extLst>
               <a:ext uri="{FF2B5EF4-FFF2-40B4-BE49-F238E27FC236}">
-                <a16:creationId xmlns:a16="http://schemas.microsoft.com/office/drawing/2014/main" id="{CB6D8A3C-1082-4255-9556-0AE3CBADAAC2}"/>
+                <a16:creationId xmlns:a16="http://schemas.microsoft.com/office/drawing/2014/main" xmlns="" id="{CB6D8A3C-1082-4255-9556-0AE3CBADAAC2}"/>
               </a:ext>
             </a:extLst>
           </p:cNvPr>
@@ -12636,7 +13375,7 @@
           <p:cNvPr id="23" name="Stern: 5 Zacken 22">
             <a:extLst>
               <a:ext uri="{FF2B5EF4-FFF2-40B4-BE49-F238E27FC236}">
-                <a16:creationId xmlns:a16="http://schemas.microsoft.com/office/drawing/2014/main" id="{30ACAD23-06F1-4109-8CB7-3983EAC26B6E}"/>
+                <a16:creationId xmlns:a16="http://schemas.microsoft.com/office/drawing/2014/main" xmlns="" id="{30ACAD23-06F1-4109-8CB7-3983EAC26B6E}"/>
               </a:ext>
             </a:extLst>
           </p:cNvPr>
@@ -12690,7 +13429,7 @@
           <p:cNvPr id="24" name="Ellipse 23">
             <a:extLst>
               <a:ext uri="{FF2B5EF4-FFF2-40B4-BE49-F238E27FC236}">
-                <a16:creationId xmlns:a16="http://schemas.microsoft.com/office/drawing/2014/main" id="{1E130FB0-31E0-48E1-BBE6-B0DDCA3F1952}"/>
+                <a16:creationId xmlns:a16="http://schemas.microsoft.com/office/drawing/2014/main" xmlns="" id="{1E130FB0-31E0-48E1-BBE6-B0DDCA3F1952}"/>
               </a:ext>
             </a:extLst>
           </p:cNvPr>
@@ -12742,7 +13481,7 @@
           <p:cNvPr id="25" name="Ellipse 24">
             <a:extLst>
               <a:ext uri="{FF2B5EF4-FFF2-40B4-BE49-F238E27FC236}">
-                <a16:creationId xmlns:a16="http://schemas.microsoft.com/office/drawing/2014/main" id="{909F81B8-BBC3-41DE-BFEA-18D8DE20A4A0}"/>
+                <a16:creationId xmlns:a16="http://schemas.microsoft.com/office/drawing/2014/main" xmlns="" id="{909F81B8-BBC3-41DE-BFEA-18D8DE20A4A0}"/>
               </a:ext>
             </a:extLst>
           </p:cNvPr>
@@ -12794,7 +13533,7 @@
           <p:cNvPr id="26" name="Textfeld 25">
             <a:extLst>
               <a:ext uri="{FF2B5EF4-FFF2-40B4-BE49-F238E27FC236}">
-                <a16:creationId xmlns:a16="http://schemas.microsoft.com/office/drawing/2014/main" id="{E1A66F3B-E0D0-47BD-BF9A-2E68700102D7}"/>
+                <a16:creationId xmlns:a16="http://schemas.microsoft.com/office/drawing/2014/main" xmlns="" id="{E1A66F3B-E0D0-47BD-BF9A-2E68700102D7}"/>
               </a:ext>
             </a:extLst>
           </p:cNvPr>
@@ -13485,10 +14224,10 @@
           <p:cNvPr id="12" name="Rectangle 11">
             <a:extLst>
               <a:ext uri="{FF2B5EF4-FFF2-40B4-BE49-F238E27FC236}">
-                <a16:creationId xmlns:a16="http://schemas.microsoft.com/office/drawing/2014/main" id="{B44C3061-D558-447B-A988-09ECE14461D7}"/>
+                <a16:creationId xmlns:a16="http://schemas.microsoft.com/office/drawing/2014/main" xmlns="" id="{B44C3061-D558-447B-A988-09ECE14461D7}"/>
               </a:ext>
               <a:ext uri="{C183D7F6-B498-43B3-948B-1728B52AA6E4}">
-                <adec:decorative xmlns:adec="http://schemas.microsoft.com/office/drawing/2017/decorative" val="1"/>
+                <adec:decorative xmlns:adec="http://schemas.microsoft.com/office/drawing/2017/decorative" xmlns="" val="1"/>
               </a:ext>
             </a:extLst>
           </p:cNvPr>
@@ -13498,7 +14237,7 @@
           <p:nvPr>
             <p:extLst>
               <p:ext uri="{386F3935-93C4-4BCD-93E2-E3B085C9AB24}">
-                <p16:designElem xmlns:p16="http://schemas.microsoft.com/office/powerpoint/2015/main" val="1"/>
+                <p16:designElem xmlns:p16="http://schemas.microsoft.com/office/powerpoint/2015/main" xmlns="" val="1"/>
               </p:ext>
             </p:extLst>
           </p:nvPr>
@@ -13545,10 +14284,10 @@
           <p:cNvPr id="14" name="Rectangle 13">
             <a:extLst>
               <a:ext uri="{FF2B5EF4-FFF2-40B4-BE49-F238E27FC236}">
-                <a16:creationId xmlns:a16="http://schemas.microsoft.com/office/drawing/2014/main" id="{59339771-9C8F-497E-8974-E09A86FEEB23}"/>
+                <a16:creationId xmlns:a16="http://schemas.microsoft.com/office/drawing/2014/main" xmlns="" id="{59339771-9C8F-497E-8974-E09A86FEEB23}"/>
               </a:ext>
               <a:ext uri="{C183D7F6-B498-43B3-948B-1728B52AA6E4}">
-                <adec:decorative xmlns:adec="http://schemas.microsoft.com/office/drawing/2017/decorative" val="1"/>
+                <adec:decorative xmlns:adec="http://schemas.microsoft.com/office/drawing/2017/decorative" xmlns="" val="1"/>
               </a:ext>
             </a:extLst>
           </p:cNvPr>
@@ -13558,7 +14297,7 @@
           <p:nvPr>
             <p:extLst>
               <p:ext uri="{386F3935-93C4-4BCD-93E2-E3B085C9AB24}">
-                <p16:designElem xmlns:p16="http://schemas.microsoft.com/office/powerpoint/2015/main" val="1"/>
+                <p16:designElem xmlns:p16="http://schemas.microsoft.com/office/powerpoint/2015/main" xmlns="" val="1"/>
               </p:ext>
             </p:extLst>
           </p:nvPr>
@@ -13600,7 +14339,7 @@
           <p:cNvPr id="2" name="Titel 1">
             <a:extLst>
               <a:ext uri="{FF2B5EF4-FFF2-40B4-BE49-F238E27FC236}">
-                <a16:creationId xmlns:a16="http://schemas.microsoft.com/office/drawing/2014/main" id="{024FB30C-45D5-4A6E-861B-AC316BA5D430}"/>
+                <a16:creationId xmlns:a16="http://schemas.microsoft.com/office/drawing/2014/main" xmlns="" id="{024FB30C-45D5-4A6E-861B-AC316BA5D430}"/>
               </a:ext>
             </a:extLst>
           </p:cNvPr>
@@ -13668,7 +14407,7 @@
           <p:cNvPr id="9" name="Content Placeholder 8">
             <a:extLst>
               <a:ext uri="{FF2B5EF4-FFF2-40B4-BE49-F238E27FC236}">
-                <a16:creationId xmlns:a16="http://schemas.microsoft.com/office/drawing/2014/main" id="{1C0D0782-8490-4FB9-A235-992C1F1F1C25}"/>
+                <a16:creationId xmlns:a16="http://schemas.microsoft.com/office/drawing/2014/main" xmlns="" id="{1C0D0782-8490-4FB9-A235-992C1F1F1C25}"/>
               </a:ext>
             </a:extLst>
           </p:cNvPr>
@@ -13769,10 +14508,10 @@
           <p:cNvPr id="16" name="Rectangle 15">
             <a:extLst>
               <a:ext uri="{FF2B5EF4-FFF2-40B4-BE49-F238E27FC236}">
-                <a16:creationId xmlns:a16="http://schemas.microsoft.com/office/drawing/2014/main" id="{BDB54B0B-6CFB-4B92-A5DC-5DCD05BE5B4D}"/>
+                <a16:creationId xmlns:a16="http://schemas.microsoft.com/office/drawing/2014/main" xmlns="" id="{BDB54B0B-6CFB-4B92-A5DC-5DCD05BE5B4D}"/>
               </a:ext>
               <a:ext uri="{C183D7F6-B498-43B3-948B-1728B52AA6E4}">
-                <adec:decorative xmlns:adec="http://schemas.microsoft.com/office/drawing/2017/decorative" val="1"/>
+                <adec:decorative xmlns:adec="http://schemas.microsoft.com/office/drawing/2017/decorative" xmlns="" val="1"/>
               </a:ext>
             </a:extLst>
           </p:cNvPr>
@@ -13782,7 +14521,7 @@
           <p:nvPr>
             <p:extLst>
               <p:ext uri="{386F3935-93C4-4BCD-93E2-E3B085C9AB24}">
-                <p16:designElem xmlns:p16="http://schemas.microsoft.com/office/powerpoint/2015/main" val="1"/>
+                <p16:designElem xmlns:p16="http://schemas.microsoft.com/office/powerpoint/2015/main" xmlns="" val="1"/>
               </p:ext>
             </p:extLst>
           </p:nvPr>
@@ -13824,7 +14563,7 @@
           <p:cNvPr id="7" name="Inhaltsplatzhalter 3">
             <a:extLst>
               <a:ext uri="{FF2B5EF4-FFF2-40B4-BE49-F238E27FC236}">
-                <a16:creationId xmlns:a16="http://schemas.microsoft.com/office/drawing/2014/main" id="{98A9C15B-CCC4-4E5C-B799-5CC331BD3332}"/>
+                <a16:creationId xmlns:a16="http://schemas.microsoft.com/office/drawing/2014/main" xmlns="" id="{98A9C15B-CCC4-4E5C-B799-5CC331BD3332}"/>
               </a:ext>
             </a:extLst>
           </p:cNvPr>
@@ -13883,7 +14622,7 @@
           <p:cNvPr id="2" name="Titel 1">
             <a:extLst>
               <a:ext uri="{FF2B5EF4-FFF2-40B4-BE49-F238E27FC236}">
-                <a16:creationId xmlns:a16="http://schemas.microsoft.com/office/drawing/2014/main" id="{2D19F794-8599-4A1D-A689-743EBDA80DB4}"/>
+                <a16:creationId xmlns:a16="http://schemas.microsoft.com/office/drawing/2014/main" xmlns="" id="{2D19F794-8599-4A1D-A689-743EBDA80DB4}"/>
               </a:ext>
             </a:extLst>
           </p:cNvPr>
@@ -13928,7 +14667,7 @@
           <p:cNvPr id="4" name="Textfeld 3">
             <a:extLst>
               <a:ext uri="{FF2B5EF4-FFF2-40B4-BE49-F238E27FC236}">
-                <a16:creationId xmlns:a16="http://schemas.microsoft.com/office/drawing/2014/main" id="{5E36B305-D4C6-4B27-9782-732C3867DEA7}"/>
+                <a16:creationId xmlns:a16="http://schemas.microsoft.com/office/drawing/2014/main" xmlns="" id="{5E36B305-D4C6-4B27-9782-732C3867DEA7}"/>
               </a:ext>
             </a:extLst>
           </p:cNvPr>
@@ -14544,7 +15283,7 @@
           <p:cNvPr id="2" name="Titel 1">
             <a:extLst>
               <a:ext uri="{FF2B5EF4-FFF2-40B4-BE49-F238E27FC236}">
-                <a16:creationId xmlns:a16="http://schemas.microsoft.com/office/drawing/2014/main" id="{F6CDE045-1C18-44A9-946E-E74089FBB179}"/>
+                <a16:creationId xmlns:a16="http://schemas.microsoft.com/office/drawing/2014/main" xmlns="" id="{F6CDE045-1C18-44A9-946E-E74089FBB179}"/>
               </a:ext>
             </a:extLst>
           </p:cNvPr>
@@ -14586,7 +15325,7 @@
           <p:cNvPr id="5" name="Inhaltsplatzhalter 4">
             <a:extLst>
               <a:ext uri="{FF2B5EF4-FFF2-40B4-BE49-F238E27FC236}">
-                <a16:creationId xmlns:a16="http://schemas.microsoft.com/office/drawing/2014/main" id="{C2F4A0CB-AF1A-4BE8-829B-9C5B7E49D064}"/>
+                <a16:creationId xmlns:a16="http://schemas.microsoft.com/office/drawing/2014/main" xmlns="" id="{C2F4A0CB-AF1A-4BE8-829B-9C5B7E49D064}"/>
               </a:ext>
             </a:extLst>
           </p:cNvPr>
@@ -14651,7 +15390,7 @@
           <p:cNvPr id="3" name="Inhaltsplatzhalter 2">
             <a:extLst>
               <a:ext uri="{FF2B5EF4-FFF2-40B4-BE49-F238E27FC236}">
-                <a16:creationId xmlns:a16="http://schemas.microsoft.com/office/drawing/2014/main" id="{56D22BFB-FDAA-4D7E-88D9-C29E57B7C51D}"/>
+                <a16:creationId xmlns:a16="http://schemas.microsoft.com/office/drawing/2014/main" xmlns="" id="{56D22BFB-FDAA-4D7E-88D9-C29E57B7C51D}"/>
               </a:ext>
             </a:extLst>
           </p:cNvPr>
@@ -14690,7 +15429,7 @@
           <p:cNvPr id="4" name="Inhaltsplatzhalter 3">
             <a:extLst>
               <a:ext uri="{FF2B5EF4-FFF2-40B4-BE49-F238E27FC236}">
-                <a16:creationId xmlns:a16="http://schemas.microsoft.com/office/drawing/2014/main" id="{370A4785-6A67-4835-A53B-8D4F4DA15C1E}"/>
+                <a16:creationId xmlns:a16="http://schemas.microsoft.com/office/drawing/2014/main" xmlns="" id="{370A4785-6A67-4835-A53B-8D4F4DA15C1E}"/>
               </a:ext>
             </a:extLst>
           </p:cNvPr>
@@ -14720,7 +15459,7 @@
           <p:cNvPr id="5" name="Grafik 7">
             <a:extLst>
               <a:ext uri="{FF2B5EF4-FFF2-40B4-BE49-F238E27FC236}">
-                <a16:creationId xmlns:a16="http://schemas.microsoft.com/office/drawing/2014/main" id="{5252049F-1455-46B7-9B58-C400DA353D3F}"/>
+                <a16:creationId xmlns:a16="http://schemas.microsoft.com/office/drawing/2014/main" xmlns="" id="{5252049F-1455-46B7-9B58-C400DA353D3F}"/>
               </a:ext>
             </a:extLst>
           </p:cNvPr>
@@ -14750,7 +15489,7 @@
           <p:cNvPr id="6" name="Textfeld 9">
             <a:extLst>
               <a:ext uri="{FF2B5EF4-FFF2-40B4-BE49-F238E27FC236}">
-                <a16:creationId xmlns:a16="http://schemas.microsoft.com/office/drawing/2014/main" id="{DEDCDEB8-1162-4AAC-93D8-F1A1F6FB9B4B}"/>
+                <a16:creationId xmlns:a16="http://schemas.microsoft.com/office/drawing/2014/main" xmlns="" id="{DEDCDEB8-1162-4AAC-93D8-F1A1F6FB9B4B}"/>
               </a:ext>
             </a:extLst>
           </p:cNvPr>
@@ -14964,7 +15703,7 @@
           <p:cNvPr id="7" name="Titel 1">
             <a:extLst>
               <a:ext uri="{FF2B5EF4-FFF2-40B4-BE49-F238E27FC236}">
-                <a16:creationId xmlns:a16="http://schemas.microsoft.com/office/drawing/2014/main" id="{3D022FA1-1227-4EA1-8EB1-679CE9C5CFCD}"/>
+                <a16:creationId xmlns:a16="http://schemas.microsoft.com/office/drawing/2014/main" xmlns="" id="{3D022FA1-1227-4EA1-8EB1-679CE9C5CFCD}"/>
               </a:ext>
             </a:extLst>
           </p:cNvPr>
@@ -15123,257 +15862,10 @@
           <a:chExt cx="0" cy="0"/>
         </a:xfrm>
       </p:grpSpPr>
-      <p:sp>
-        <p:nvSpPr>
-          <p:cNvPr id="2" name="Titel 1">
-            <a:extLst>
-              <a:ext uri="{FF2B5EF4-FFF2-40B4-BE49-F238E27FC236}">
-                <a16:creationId xmlns:a16="http://schemas.microsoft.com/office/drawing/2014/main" id="{3D022FA1-1227-4EA1-8EB1-679CE9C5CFCD}"/>
-              </a:ext>
-            </a:extLst>
-          </p:cNvPr>
-          <p:cNvSpPr>
-            <a:spLocks noGrp="1"/>
-          </p:cNvSpPr>
-          <p:nvPr>
-            <p:ph type="title"/>
-          </p:nvPr>
-        </p:nvSpPr>
-        <p:spPr/>
-        <p:txBody>
-          <a:bodyPr/>
-          <a:lstStyle/>
-          <a:p>
-            <a:r>
-              <a:rPr lang="de-DE" dirty="0" err="1"/>
-              <a:t>Finding</a:t>
-            </a:r>
-            <a:r>
-              <a:rPr lang="de-DE" dirty="0"/>
-              <a:t> </a:t>
-            </a:r>
-            <a:r>
-              <a:rPr lang="de-DE" dirty="0" err="1"/>
-              <a:t>meta</a:t>
-            </a:r>
-            <a:r>
-              <a:rPr lang="de-DE" dirty="0"/>
-              <a:t> </a:t>
-            </a:r>
-            <a:r>
-              <a:rPr lang="de-DE" dirty="0" err="1"/>
-              <a:t>digits</a:t>
-            </a:r>
-            <a:endParaRPr lang="de-DE" dirty="0"/>
-          </a:p>
-        </p:txBody>
-      </p:sp>
-      <p:sp>
-        <p:nvSpPr>
-          <p:cNvPr id="3" name="Inhaltsplatzhalter 2">
-            <a:extLst>
-              <a:ext uri="{FF2B5EF4-FFF2-40B4-BE49-F238E27FC236}">
-                <a16:creationId xmlns:a16="http://schemas.microsoft.com/office/drawing/2014/main" id="{56D22BFB-FDAA-4D7E-88D9-C29E57B7C51D}"/>
-              </a:ext>
-            </a:extLst>
-          </p:cNvPr>
-          <p:cNvSpPr>
-            <a:spLocks noGrp="1"/>
-          </p:cNvSpPr>
-          <p:nvPr>
-            <p:ph idx="1"/>
-          </p:nvPr>
-        </p:nvSpPr>
-        <p:spPr/>
-        <p:txBody>
-          <a:bodyPr/>
-          <a:lstStyle/>
-          <a:p>
-            <a:pPr marL="0" indent="0">
-              <a:buNone/>
-            </a:pPr>
-            <a:r>
-              <a:rPr lang="de-DE" dirty="0"/>
-              <a:t> </a:t>
-            </a:r>
-            <a:r>
-              <a:rPr lang="de-DE" dirty="0" err="1"/>
-              <a:t>Objective</a:t>
-            </a:r>
-            <a:r>
-              <a:rPr lang="de-DE" dirty="0"/>
-              <a:t>: Find </a:t>
-            </a:r>
-            <a:r>
-              <a:rPr lang="de-DE" dirty="0" err="1"/>
-              <a:t>best</a:t>
-            </a:r>
-            <a:r>
-              <a:rPr lang="de-DE" dirty="0"/>
-              <a:t> </a:t>
-            </a:r>
-            <a:r>
-              <a:rPr lang="de-DE" dirty="0" err="1"/>
-              <a:t>recognizable</a:t>
-            </a:r>
-            <a:r>
-              <a:rPr lang="de-DE" dirty="0"/>
-              <a:t> </a:t>
-            </a:r>
-            <a:r>
-              <a:rPr lang="de-DE" dirty="0" err="1"/>
-              <a:t>image</a:t>
-            </a:r>
-            <a:r>
-              <a:rPr lang="de-DE" dirty="0"/>
-              <a:t> </a:t>
-            </a:r>
-            <a:r>
-              <a:rPr lang="de-DE" dirty="0" err="1"/>
-              <a:t>for</a:t>
-            </a:r>
-            <a:r>
-              <a:rPr lang="de-DE" dirty="0"/>
-              <a:t> </a:t>
-            </a:r>
-            <a:r>
-              <a:rPr lang="de-DE" dirty="0" err="1"/>
-              <a:t>each</a:t>
-            </a:r>
-            <a:r>
-              <a:rPr lang="de-DE" dirty="0"/>
-              <a:t> </a:t>
-            </a:r>
-            <a:r>
-              <a:rPr lang="de-DE" dirty="0" err="1"/>
-              <a:t>digit</a:t>
-            </a:r>
-            <a:r>
-              <a:rPr lang="de-DE" dirty="0"/>
-              <a:t>.</a:t>
-            </a:r>
-          </a:p>
-          <a:p>
-            <a:pPr marL="0" indent="0">
-              <a:buNone/>
-            </a:pPr>
-            <a:r>
-              <a:rPr lang="de-DE" dirty="0" err="1"/>
-              <a:t>allows</a:t>
-            </a:r>
-            <a:r>
-              <a:rPr lang="de-DE" dirty="0"/>
-              <a:t> </a:t>
-            </a:r>
-            <a:r>
-              <a:rPr lang="de-DE" dirty="0" err="1"/>
-              <a:t>us</a:t>
-            </a:r>
-            <a:r>
-              <a:rPr lang="de-DE" dirty="0"/>
-              <a:t> </a:t>
-            </a:r>
-            <a:r>
-              <a:rPr lang="de-DE" dirty="0" err="1"/>
-              <a:t>to</a:t>
-            </a:r>
-            <a:r>
-              <a:rPr lang="de-DE" dirty="0"/>
-              <a:t>: 	</a:t>
-            </a:r>
-            <a:r>
-              <a:rPr lang="de-DE" dirty="0" err="1"/>
-              <a:t>evaluate</a:t>
-            </a:r>
-            <a:r>
-              <a:rPr lang="de-DE" dirty="0"/>
-              <a:t> </a:t>
-            </a:r>
-            <a:r>
-              <a:rPr lang="de-DE" dirty="0" err="1"/>
-              <a:t>digits</a:t>
-            </a:r>
-            <a:endParaRPr lang="de-DE" dirty="0"/>
-          </a:p>
-          <a:p>
-            <a:pPr marL="0" indent="0">
-              <a:buNone/>
-            </a:pPr>
-            <a:r>
-              <a:rPr lang="de-DE" dirty="0"/>
-              <a:t>		</a:t>
-            </a:r>
-            <a:r>
-              <a:rPr lang="de-DE" dirty="0" err="1"/>
-              <a:t>analyze</a:t>
-            </a:r>
-            <a:r>
-              <a:rPr lang="de-DE" dirty="0"/>
-              <a:t> </a:t>
-            </a:r>
-            <a:r>
-              <a:rPr lang="de-DE" dirty="0" err="1"/>
-              <a:t>wrong</a:t>
-            </a:r>
-            <a:r>
-              <a:rPr lang="de-DE" dirty="0"/>
-              <a:t> </a:t>
-            </a:r>
-            <a:r>
-              <a:rPr lang="de-DE" dirty="0" err="1"/>
-              <a:t>recognized</a:t>
-            </a:r>
-            <a:r>
-              <a:rPr lang="de-DE" dirty="0"/>
-              <a:t> </a:t>
-            </a:r>
-            <a:r>
-              <a:rPr lang="de-DE" dirty="0" err="1"/>
-              <a:t>images</a:t>
-            </a:r>
-            <a:endParaRPr lang="de-DE" dirty="0"/>
-          </a:p>
-          <a:p>
-            <a:pPr marL="0" indent="0">
-              <a:buNone/>
-            </a:pPr>
-            <a:r>
-              <a:rPr lang="de-DE" dirty="0"/>
-              <a:t>		</a:t>
-            </a:r>
-          </a:p>
-          <a:p>
-            <a:pPr marL="0" indent="0">
-              <a:buNone/>
-            </a:pPr>
-            <a:r>
-              <a:rPr lang="de-DE" dirty="0"/>
-              <a:t> 3 different </a:t>
-            </a:r>
-            <a:r>
-              <a:rPr lang="de-DE" dirty="0" err="1"/>
-              <a:t>methods</a:t>
-            </a:r>
-            <a:endParaRPr lang="de-DE" dirty="0"/>
-          </a:p>
-          <a:p>
-            <a:pPr marL="0" indent="0">
-              <a:buNone/>
-            </a:pPr>
-            <a:endParaRPr lang="de-DE" dirty="0"/>
-          </a:p>
-          <a:p>
-            <a:pPr marL="0" indent="0">
-              <a:buNone/>
-            </a:pPr>
-            <a:endParaRPr lang="de-DE" dirty="0"/>
-          </a:p>
-        </p:txBody>
-      </p:sp>
     </p:spTree>
     <p:extLst>
       <p:ext uri="{BB962C8B-B14F-4D97-AF65-F5344CB8AC3E}">
-        <p14:creationId xmlns:p14="http://schemas.microsoft.com/office/powerpoint/2010/main" val="1548118980"/>
+        <p14:creationId xmlns:p14="http://schemas.microsoft.com/office/powerpoint/2010/main" val="1191277699"/>
       </p:ext>
     </p:extLst>
   </p:cSld>
@@ -16166,7 +16658,7 @@
   <a:extraClrSchemeLst/>
   <a:extLst>
     <a:ext uri="{05A4C25C-085E-4340-85A3-A5531E510DB2}">
-      <thm15:themeFamily xmlns:thm15="http://schemas.microsoft.com/office/thememl/2012/main" name="Retrospect" id="{5F128B03-DCCA-4EEB-AB3B-CF2899314A46}" vid="{9CC26709-368C-4D72-9060-94E5B3FF3CD6}"/>
+      <thm15:themeFamily xmlns:thm15="http://schemas.microsoft.com/office/thememl/2012/main" xmlns="" name="Retrospect" id="{5F128B03-DCCA-4EEB-AB3B-CF2899314A46}" vid="{9CC26709-368C-4D72-9060-94E5B3FF3CD6}"/>
     </a:ext>
   </a:extLst>
 </a:theme>

</xml_diff>

<commit_message>
some things to investigate added, still think about them
</commit_message>
<xml_diff>
--- a/presentation_digit_recog2.pptx
+++ b/presentation_digit_recog2.pptx
@@ -124,7 +124,7 @@
   </p:defaultTextStyle>
   <p:extLst>
     <p:ext uri="{EFAFB233-063F-42B5-8137-9DF3F51BA10A}">
-      <p15:sldGuideLst xmlns:p15="http://schemas.microsoft.com/office/powerpoint/2012/main" xmlns="">
+      <p15:sldGuideLst xmlns="" xmlns:p15="http://schemas.microsoft.com/office/powerpoint/2012/main">
         <p15:guide id="1" orient="horz" pos="2160">
           <p15:clr>
             <a:srgbClr val="A4A3A4"/>
@@ -9621,7 +9621,7 @@
           <p:cNvPr id="5" name="Grafik 4">
             <a:extLst>
               <a:ext uri="{FF2B5EF4-FFF2-40B4-BE49-F238E27FC236}">
-                <a16:creationId xmlns:a16="http://schemas.microsoft.com/office/drawing/2014/main" xmlns="" id="{541C1A54-8968-4CEF-8CA1-E84FB3A8524D}"/>
+                <a16:creationId xmlns="" xmlns:a16="http://schemas.microsoft.com/office/drawing/2014/main" id="{541C1A54-8968-4CEF-8CA1-E84FB3A8524D}"/>
               </a:ext>
             </a:extLst>
           </p:cNvPr>
@@ -9657,7 +9657,7 @@
           <p:cNvPr id="2" name="Titel 1">
             <a:extLst>
               <a:ext uri="{FF2B5EF4-FFF2-40B4-BE49-F238E27FC236}">
-                <a16:creationId xmlns:a16="http://schemas.microsoft.com/office/drawing/2014/main" xmlns="" id="{90A6468B-D0CD-4DC7-A3AD-DA2E2B071416}"/>
+                <a16:creationId xmlns="" xmlns:a16="http://schemas.microsoft.com/office/drawing/2014/main" id="{90A6468B-D0CD-4DC7-A3AD-DA2E2B071416}"/>
               </a:ext>
             </a:extLst>
           </p:cNvPr>
@@ -9696,7 +9696,7 @@
           <p:cNvPr id="3" name="Untertitel 2">
             <a:extLst>
               <a:ext uri="{FF2B5EF4-FFF2-40B4-BE49-F238E27FC236}">
-                <a16:creationId xmlns:a16="http://schemas.microsoft.com/office/drawing/2014/main" xmlns="" id="{65A5BDD7-952D-4603-93C5-6E59619C765A}"/>
+                <a16:creationId xmlns="" xmlns:a16="http://schemas.microsoft.com/office/drawing/2014/main" id="{65A5BDD7-952D-4603-93C5-6E59619C765A}"/>
               </a:ext>
             </a:extLst>
           </p:cNvPr>
@@ -9735,10 +9735,10 @@
           <p:cNvPr id="10" name="Straight Connector 9">
             <a:extLst>
               <a:ext uri="{FF2B5EF4-FFF2-40B4-BE49-F238E27FC236}">
-                <a16:creationId xmlns:a16="http://schemas.microsoft.com/office/drawing/2014/main" xmlns="" id="{F3CC58E3-BDF9-495D-9327-85F68058BE32}"/>
+                <a16:creationId xmlns="" xmlns:a16="http://schemas.microsoft.com/office/drawing/2014/main" id="{F3CC58E3-BDF9-495D-9327-85F68058BE32}"/>
               </a:ext>
               <a:ext uri="{C183D7F6-B498-43B3-948B-1728B52AA6E4}">
-                <adec:decorative xmlns:adec="http://schemas.microsoft.com/office/drawing/2017/decorative" xmlns="" val="1"/>
+                <adec:decorative xmlns="" xmlns:adec="http://schemas.microsoft.com/office/drawing/2017/decorative" val="1"/>
               </a:ext>
             </a:extLst>
           </p:cNvPr>
@@ -9748,7 +9748,7 @@
           <p:nvPr>
             <p:extLst>
               <p:ext uri="{386F3935-93C4-4BCD-93E2-E3B085C9AB24}">
-                <p16:designElem xmlns:p16="http://schemas.microsoft.com/office/powerpoint/2015/main" xmlns="" val="1"/>
+                <p16:designElem xmlns="" xmlns:p16="http://schemas.microsoft.com/office/powerpoint/2015/main" val="1"/>
               </p:ext>
             </p:extLst>
           </p:nvPr>
@@ -9789,10 +9789,10 @@
           <p:cNvPr id="12" name="Rectangle 11">
             <a:extLst>
               <a:ext uri="{FF2B5EF4-FFF2-40B4-BE49-F238E27FC236}">
-                <a16:creationId xmlns:a16="http://schemas.microsoft.com/office/drawing/2014/main" xmlns="" id="{DA0CA737-33FC-47E3-965A-D1C2CAA62894}"/>
+                <a16:creationId xmlns="" xmlns:a16="http://schemas.microsoft.com/office/drawing/2014/main" id="{DA0CA737-33FC-47E3-965A-D1C2CAA62894}"/>
               </a:ext>
               <a:ext uri="{C183D7F6-B498-43B3-948B-1728B52AA6E4}">
-                <adec:decorative xmlns:adec="http://schemas.microsoft.com/office/drawing/2017/decorative" xmlns="" val="1"/>
+                <adec:decorative xmlns="" xmlns:adec="http://schemas.microsoft.com/office/drawing/2017/decorative" val="1"/>
               </a:ext>
             </a:extLst>
           </p:cNvPr>
@@ -9802,7 +9802,7 @@
           <p:nvPr>
             <p:extLst>
               <p:ext uri="{386F3935-93C4-4BCD-93E2-E3B085C9AB24}">
-                <p16:designElem xmlns:p16="http://schemas.microsoft.com/office/powerpoint/2015/main" xmlns="" val="1"/>
+                <p16:designElem xmlns="" xmlns:p16="http://schemas.microsoft.com/office/powerpoint/2015/main" val="1"/>
               </p:ext>
             </p:extLst>
           </p:nvPr>
@@ -9844,10 +9844,10 @@
           <p:cNvPr id="14" name="Rectangle 13">
             <a:extLst>
               <a:ext uri="{FF2B5EF4-FFF2-40B4-BE49-F238E27FC236}">
-                <a16:creationId xmlns:a16="http://schemas.microsoft.com/office/drawing/2014/main" xmlns="" id="{22189942-24EB-488E-8B69-EB80F7E53E36}"/>
+                <a16:creationId xmlns="" xmlns:a16="http://schemas.microsoft.com/office/drawing/2014/main" id="{22189942-24EB-488E-8B69-EB80F7E53E36}"/>
               </a:ext>
               <a:ext uri="{C183D7F6-B498-43B3-948B-1728B52AA6E4}">
-                <adec:decorative xmlns:adec="http://schemas.microsoft.com/office/drawing/2017/decorative" xmlns="" val="1"/>
+                <adec:decorative xmlns="" xmlns:adec="http://schemas.microsoft.com/office/drawing/2017/decorative" val="1"/>
               </a:ext>
             </a:extLst>
           </p:cNvPr>
@@ -9857,7 +9857,7 @@
           <p:nvPr>
             <p:extLst>
               <p:ext uri="{386F3935-93C4-4BCD-93E2-E3B085C9AB24}">
-                <p16:designElem xmlns:p16="http://schemas.microsoft.com/office/powerpoint/2015/main" xmlns="" val="1"/>
+                <p16:designElem xmlns="" xmlns:p16="http://schemas.microsoft.com/office/powerpoint/2015/main" val="1"/>
               </p:ext>
             </p:extLst>
           </p:nvPr>
@@ -9929,7 +9929,7 @@
           <p:cNvPr id="2" name="Titel 1">
             <a:extLst>
               <a:ext uri="{FF2B5EF4-FFF2-40B4-BE49-F238E27FC236}">
-                <a16:creationId xmlns:a16="http://schemas.microsoft.com/office/drawing/2014/main" xmlns="" id="{3D022FA1-1227-4EA1-8EB1-679CE9C5CFCD}"/>
+                <a16:creationId xmlns="" xmlns:a16="http://schemas.microsoft.com/office/drawing/2014/main" id="{3D022FA1-1227-4EA1-8EB1-679CE9C5CFCD}"/>
               </a:ext>
             </a:extLst>
           </p:cNvPr>
@@ -9976,7 +9976,7 @@
           <p:cNvPr id="3" name="Inhaltsplatzhalter 2">
             <a:extLst>
               <a:ext uri="{FF2B5EF4-FFF2-40B4-BE49-F238E27FC236}">
-                <a16:creationId xmlns:a16="http://schemas.microsoft.com/office/drawing/2014/main" xmlns="" id="{56D22BFB-FDAA-4D7E-88D9-C29E57B7C51D}"/>
+                <a16:creationId xmlns="" xmlns:a16="http://schemas.microsoft.com/office/drawing/2014/main" id="{56D22BFB-FDAA-4D7E-88D9-C29E57B7C51D}"/>
               </a:ext>
             </a:extLst>
           </p:cNvPr>
@@ -10037,18 +10037,7 @@
                   </a:schemeClr>
                 </a:solidFill>
               </a:rPr>
-              <a:t> Some</a:t>
-            </a:r>
-            <a:r>
-              <a:rPr lang="de-DE" sz="2400" dirty="0" smtClean="0">
-                <a:solidFill>
-                  <a:schemeClr val="tx1">
-                    <a:lumMod val="95000"/>
-                    <a:lumOff val="5000"/>
-                  </a:schemeClr>
-                </a:solidFill>
-              </a:rPr>
-              <a:t>thing </a:t>
+              <a:t> Something </a:t>
             </a:r>
             <a:r>
               <a:rPr lang="de-DE" sz="2400" dirty="0" err="1" smtClean="0">
@@ -10337,7 +10326,7 @@
           <p:cNvPr id="10" name="Inhaltsplatzhalter 9">
             <a:extLst>
               <a:ext uri="{FF2B5EF4-FFF2-40B4-BE49-F238E27FC236}">
-                <a16:creationId xmlns:a16="http://schemas.microsoft.com/office/drawing/2014/main" xmlns="" id="{65A23C4D-F599-40EB-9F55-473E092C8DBD}"/>
+                <a16:creationId xmlns="" xmlns:a16="http://schemas.microsoft.com/office/drawing/2014/main" id="{65A23C4D-F599-40EB-9F55-473E092C8DBD}"/>
               </a:ext>
             </a:extLst>
           </p:cNvPr>
@@ -10371,7 +10360,7 @@
           <p:cNvPr id="8" name="Inhaltsplatzhalter 7">
             <a:extLst>
               <a:ext uri="{FF2B5EF4-FFF2-40B4-BE49-F238E27FC236}">
-                <a16:creationId xmlns:a16="http://schemas.microsoft.com/office/drawing/2014/main" xmlns="" id="{AC8FC20D-C4BB-4858-9AA7-67A6D2F24CB1}"/>
+                <a16:creationId xmlns="" xmlns:a16="http://schemas.microsoft.com/office/drawing/2014/main" id="{AC8FC20D-C4BB-4858-9AA7-67A6D2F24CB1}"/>
               </a:ext>
             </a:extLst>
           </p:cNvPr>
@@ -10471,7 +10460,7 @@
           <p:cNvPr id="5" name="Titel 4">
             <a:extLst>
               <a:ext uri="{FF2B5EF4-FFF2-40B4-BE49-F238E27FC236}">
-                <a16:creationId xmlns:a16="http://schemas.microsoft.com/office/drawing/2014/main" xmlns="" id="{9222B4BD-52BA-4791-9651-98D4F0FB5A4A}"/>
+                <a16:creationId xmlns="" xmlns:a16="http://schemas.microsoft.com/office/drawing/2014/main" id="{9222B4BD-52BA-4791-9651-98D4F0FB5A4A}"/>
               </a:ext>
             </a:extLst>
           </p:cNvPr>
@@ -10512,7 +10501,7 @@
           <p:cNvPr id="6" name="Inhaltsplatzhalter 5">
             <a:extLst>
               <a:ext uri="{FF2B5EF4-FFF2-40B4-BE49-F238E27FC236}">
-                <a16:creationId xmlns:a16="http://schemas.microsoft.com/office/drawing/2014/main" xmlns="" id="{1A0911F2-B0B3-45D8-B92B-270F6D60CFB4}"/>
+                <a16:creationId xmlns="" xmlns:a16="http://schemas.microsoft.com/office/drawing/2014/main" id="{1A0911F2-B0B3-45D8-B92B-270F6D60CFB4}"/>
               </a:ext>
             </a:extLst>
           </p:cNvPr>
@@ -10813,7 +10802,7 @@
           <p:cNvPr id="9" name="Inhaltsplatzhalter 8">
             <a:extLst>
               <a:ext uri="{FF2B5EF4-FFF2-40B4-BE49-F238E27FC236}">
-                <a16:creationId xmlns:a16="http://schemas.microsoft.com/office/drawing/2014/main" xmlns="" id="{9909C030-22D0-4734-9DCB-167BC6D672DF}"/>
+                <a16:creationId xmlns="" xmlns:a16="http://schemas.microsoft.com/office/drawing/2014/main" id="{9909C030-22D0-4734-9DCB-167BC6D672DF}"/>
               </a:ext>
             </a:extLst>
           </p:cNvPr>
@@ -10877,7 +10866,7 @@
           <p:cNvPr id="5" name="Titel 4">
             <a:extLst>
               <a:ext uri="{FF2B5EF4-FFF2-40B4-BE49-F238E27FC236}">
-                <a16:creationId xmlns:a16="http://schemas.microsoft.com/office/drawing/2014/main" xmlns="" id="{CB372DEC-D0F9-4D40-9149-13D17AAF964B}"/>
+                <a16:creationId xmlns="" xmlns:a16="http://schemas.microsoft.com/office/drawing/2014/main" id="{CB372DEC-D0F9-4D40-9149-13D17AAF964B}"/>
               </a:ext>
             </a:extLst>
           </p:cNvPr>
@@ -10933,7 +10922,7 @@
           <p:cNvPr id="6" name="Untertitel 5">
             <a:extLst>
               <a:ext uri="{FF2B5EF4-FFF2-40B4-BE49-F238E27FC236}">
-                <a16:creationId xmlns:a16="http://schemas.microsoft.com/office/drawing/2014/main" xmlns="" id="{72729885-95AF-4E52-9DF2-73274144A388}"/>
+                <a16:creationId xmlns="" xmlns:a16="http://schemas.microsoft.com/office/drawing/2014/main" id="{72729885-95AF-4E52-9DF2-73274144A388}"/>
               </a:ext>
             </a:extLst>
           </p:cNvPr>
@@ -10996,10 +10985,10 @@
           <p:cNvPr id="10" name="Rectangle 9">
             <a:extLst>
               <a:ext uri="{FF2B5EF4-FFF2-40B4-BE49-F238E27FC236}">
-                <a16:creationId xmlns:a16="http://schemas.microsoft.com/office/drawing/2014/main" xmlns="" id="{D829E218-74FB-4455-98BE-F2C5BA8978BE}"/>
+                <a16:creationId xmlns="" xmlns:a16="http://schemas.microsoft.com/office/drawing/2014/main" id="{D829E218-74FB-4455-98BE-F2C5BA8978BE}"/>
               </a:ext>
               <a:ext uri="{C183D7F6-B498-43B3-948B-1728B52AA6E4}">
-                <adec:decorative xmlns:adec="http://schemas.microsoft.com/office/drawing/2017/decorative" xmlns="" val="1"/>
+                <adec:decorative xmlns="" xmlns:adec="http://schemas.microsoft.com/office/drawing/2017/decorative" val="1"/>
               </a:ext>
             </a:extLst>
           </p:cNvPr>
@@ -11009,7 +10998,7 @@
           <p:nvPr>
             <p:extLst>
               <p:ext uri="{386F3935-93C4-4BCD-93E2-E3B085C9AB24}">
-                <p16:designElem xmlns:p16="http://schemas.microsoft.com/office/powerpoint/2015/main" xmlns="" val="1"/>
+                <p16:designElem xmlns="" xmlns:p16="http://schemas.microsoft.com/office/powerpoint/2015/main" val="1"/>
               </p:ext>
             </p:extLst>
           </p:nvPr>
@@ -11051,10 +11040,10 @@
           <p:cNvPr id="12" name="Rectangle 11">
             <a:extLst>
               <a:ext uri="{FF2B5EF4-FFF2-40B4-BE49-F238E27FC236}">
-                <a16:creationId xmlns:a16="http://schemas.microsoft.com/office/drawing/2014/main" xmlns="" id="{7E8D75FD-D4F9-4D11-B70D-82EFCB4CFA5B}"/>
+                <a16:creationId xmlns="" xmlns:a16="http://schemas.microsoft.com/office/drawing/2014/main" id="{7E8D75FD-D4F9-4D11-B70D-82EFCB4CFA5B}"/>
               </a:ext>
               <a:ext uri="{C183D7F6-B498-43B3-948B-1728B52AA6E4}">
-                <adec:decorative xmlns:adec="http://schemas.microsoft.com/office/drawing/2017/decorative" xmlns="" val="1"/>
+                <adec:decorative xmlns="" xmlns:adec="http://schemas.microsoft.com/office/drawing/2017/decorative" val="1"/>
               </a:ext>
             </a:extLst>
           </p:cNvPr>
@@ -11064,7 +11053,7 @@
           <p:nvPr>
             <p:extLst>
               <p:ext uri="{386F3935-93C4-4BCD-93E2-E3B085C9AB24}">
-                <p16:designElem xmlns:p16="http://schemas.microsoft.com/office/powerpoint/2015/main" xmlns="" val="1"/>
+                <p16:designElem xmlns="" xmlns:p16="http://schemas.microsoft.com/office/powerpoint/2015/main" val="1"/>
               </p:ext>
             </p:extLst>
           </p:nvPr>
@@ -11106,10 +11095,10 @@
           <p:cNvPr id="14" name="Straight Connector 13">
             <a:extLst>
               <a:ext uri="{FF2B5EF4-FFF2-40B4-BE49-F238E27FC236}">
-                <a16:creationId xmlns:a16="http://schemas.microsoft.com/office/drawing/2014/main" xmlns="" id="{1F5DC8C3-BA5F-4EED-BB9A-A14272BD82A1}"/>
+                <a16:creationId xmlns="" xmlns:a16="http://schemas.microsoft.com/office/drawing/2014/main" id="{1F5DC8C3-BA5F-4EED-BB9A-A14272BD82A1}"/>
               </a:ext>
               <a:ext uri="{C183D7F6-B498-43B3-948B-1728B52AA6E4}">
-                <adec:decorative xmlns:adec="http://schemas.microsoft.com/office/drawing/2017/decorative" xmlns="" val="1"/>
+                <adec:decorative xmlns="" xmlns:adec="http://schemas.microsoft.com/office/drawing/2017/decorative" val="1"/>
               </a:ext>
             </a:extLst>
           </p:cNvPr>
@@ -11119,7 +11108,7 @@
           <p:nvPr>
             <p:extLst>
               <p:ext uri="{386F3935-93C4-4BCD-93E2-E3B085C9AB24}">
-                <p16:designElem xmlns:p16="http://schemas.microsoft.com/office/powerpoint/2015/main" xmlns="" val="1"/>
+                <p16:designElem xmlns="" xmlns:p16="http://schemas.microsoft.com/office/powerpoint/2015/main" val="1"/>
               </p:ext>
             </p:extLst>
           </p:nvPr>
@@ -11161,10 +11150,10 @@
           <p:cNvPr id="16" name="Rectangle 15">
             <a:extLst>
               <a:ext uri="{FF2B5EF4-FFF2-40B4-BE49-F238E27FC236}">
-                <a16:creationId xmlns:a16="http://schemas.microsoft.com/office/drawing/2014/main" xmlns="" id="{8638A98B-4B4B-4607-B11F-7DCA0D7CCE17}"/>
+                <a16:creationId xmlns="" xmlns:a16="http://schemas.microsoft.com/office/drawing/2014/main" id="{8638A98B-4B4B-4607-B11F-7DCA0D7CCE17}"/>
               </a:ext>
               <a:ext uri="{C183D7F6-B498-43B3-948B-1728B52AA6E4}">
-                <adec:decorative xmlns:adec="http://schemas.microsoft.com/office/drawing/2017/decorative" xmlns="" val="1"/>
+                <adec:decorative xmlns="" xmlns:adec="http://schemas.microsoft.com/office/drawing/2017/decorative" val="1"/>
               </a:ext>
             </a:extLst>
           </p:cNvPr>
@@ -11174,7 +11163,7 @@
           <p:nvPr>
             <p:extLst>
               <p:ext uri="{386F3935-93C4-4BCD-93E2-E3B085C9AB24}">
-                <p16:designElem xmlns:p16="http://schemas.microsoft.com/office/powerpoint/2015/main" xmlns="" val="1"/>
+                <p16:designElem xmlns="" xmlns:p16="http://schemas.microsoft.com/office/powerpoint/2015/main" val="1"/>
               </p:ext>
             </p:extLst>
           </p:nvPr>
@@ -11221,7 +11210,7 @@
           <p:cNvPr id="5" name="Inhaltsplatzhalter 4">
             <a:extLst>
               <a:ext uri="{FF2B5EF4-FFF2-40B4-BE49-F238E27FC236}">
-                <a16:creationId xmlns:a16="http://schemas.microsoft.com/office/drawing/2014/main" xmlns="" id="{0F908B00-977C-447A-87EE-7A00C164B759}"/>
+                <a16:creationId xmlns="" xmlns:a16="http://schemas.microsoft.com/office/drawing/2014/main" id="{0F908B00-977C-447A-87EE-7A00C164B759}"/>
               </a:ext>
             </a:extLst>
           </p:cNvPr>
@@ -11258,10 +11247,10 @@
           <p:cNvPr id="18" name="Rectangle 17">
             <a:extLst>
               <a:ext uri="{FF2B5EF4-FFF2-40B4-BE49-F238E27FC236}">
-                <a16:creationId xmlns:a16="http://schemas.microsoft.com/office/drawing/2014/main" xmlns="" id="{8E3B9B0E-204E-4BFD-B58A-E71D9CDC37F3}"/>
+                <a16:creationId xmlns="" xmlns:a16="http://schemas.microsoft.com/office/drawing/2014/main" id="{8E3B9B0E-204E-4BFD-B58A-E71D9CDC37F3}"/>
               </a:ext>
               <a:ext uri="{C183D7F6-B498-43B3-948B-1728B52AA6E4}">
-                <adec:decorative xmlns:adec="http://schemas.microsoft.com/office/drawing/2017/decorative" xmlns="" val="1"/>
+                <adec:decorative xmlns="" xmlns:adec="http://schemas.microsoft.com/office/drawing/2017/decorative" val="1"/>
               </a:ext>
             </a:extLst>
           </p:cNvPr>
@@ -11271,7 +11260,7 @@
           <p:nvPr>
             <p:extLst>
               <p:ext uri="{386F3935-93C4-4BCD-93E2-E3B085C9AB24}">
-                <p16:designElem xmlns:p16="http://schemas.microsoft.com/office/powerpoint/2015/main" xmlns="" val="1"/>
+                <p16:designElem xmlns="" xmlns:p16="http://schemas.microsoft.com/office/powerpoint/2015/main" val="1"/>
               </p:ext>
             </p:extLst>
           </p:nvPr>
@@ -11313,7 +11302,7 @@
           <p:cNvPr id="2" name="Titel 1">
             <a:extLst>
               <a:ext uri="{FF2B5EF4-FFF2-40B4-BE49-F238E27FC236}">
-                <a16:creationId xmlns:a16="http://schemas.microsoft.com/office/drawing/2014/main" xmlns="" id="{E21935D6-F135-4DD2-A417-738E067D86CB}"/>
+                <a16:creationId xmlns="" xmlns:a16="http://schemas.microsoft.com/office/drawing/2014/main" id="{E21935D6-F135-4DD2-A417-738E067D86CB}"/>
               </a:ext>
             </a:extLst>
           </p:cNvPr>
@@ -11360,10 +11349,10 @@
           <p:cNvPr id="20" name="Rectangle 19">
             <a:extLst>
               <a:ext uri="{FF2B5EF4-FFF2-40B4-BE49-F238E27FC236}">
-                <a16:creationId xmlns:a16="http://schemas.microsoft.com/office/drawing/2014/main" xmlns="" id="{B1121E64-CB88-4BF5-B531-C0316E7F6E30}"/>
+                <a16:creationId xmlns="" xmlns:a16="http://schemas.microsoft.com/office/drawing/2014/main" id="{B1121E64-CB88-4BF5-B531-C0316E7F6E30}"/>
               </a:ext>
               <a:ext uri="{C183D7F6-B498-43B3-948B-1728B52AA6E4}">
-                <adec:decorative xmlns:adec="http://schemas.microsoft.com/office/drawing/2017/decorative" xmlns="" val="1"/>
+                <adec:decorative xmlns="" xmlns:adec="http://schemas.microsoft.com/office/drawing/2017/decorative" val="1"/>
               </a:ext>
             </a:extLst>
           </p:cNvPr>
@@ -11373,7 +11362,7 @@
           <p:nvPr>
             <p:extLst>
               <p:ext uri="{386F3935-93C4-4BCD-93E2-E3B085C9AB24}">
-                <p16:designElem xmlns:p16="http://schemas.microsoft.com/office/powerpoint/2015/main" xmlns="" val="1"/>
+                <p16:designElem xmlns="" xmlns:p16="http://schemas.microsoft.com/office/powerpoint/2015/main" val="1"/>
               </p:ext>
             </p:extLst>
           </p:nvPr>
@@ -11453,10 +11442,10 @@
           <p:cNvPr id="13" name="Rectangle 12">
             <a:extLst>
               <a:ext uri="{FF2B5EF4-FFF2-40B4-BE49-F238E27FC236}">
-                <a16:creationId xmlns:a16="http://schemas.microsoft.com/office/drawing/2014/main" xmlns="" id="{0AB6E427-3F73-4C06-A5D5-AE52C3883B50}"/>
+                <a16:creationId xmlns="" xmlns:a16="http://schemas.microsoft.com/office/drawing/2014/main" id="{0AB6E427-3F73-4C06-A5D5-AE52C3883B50}"/>
               </a:ext>
               <a:ext uri="{C183D7F6-B498-43B3-948B-1728B52AA6E4}">
-                <adec:decorative xmlns:adec="http://schemas.microsoft.com/office/drawing/2017/decorative" xmlns="" val="1"/>
+                <adec:decorative xmlns="" xmlns:adec="http://schemas.microsoft.com/office/drawing/2017/decorative" val="1"/>
               </a:ext>
             </a:extLst>
           </p:cNvPr>
@@ -11466,7 +11455,7 @@
           <p:nvPr>
             <p:extLst>
               <p:ext uri="{386F3935-93C4-4BCD-93E2-E3B085C9AB24}">
-                <p16:designElem xmlns:p16="http://schemas.microsoft.com/office/powerpoint/2015/main" xmlns="" val="1"/>
+                <p16:designElem xmlns="" xmlns:p16="http://schemas.microsoft.com/office/powerpoint/2015/main" val="1"/>
               </p:ext>
             </p:extLst>
           </p:nvPr>
@@ -11513,10 +11502,10 @@
           <p:cNvPr id="15" name="Rectangle 14">
             <a:extLst>
               <a:ext uri="{FF2B5EF4-FFF2-40B4-BE49-F238E27FC236}">
-                <a16:creationId xmlns:a16="http://schemas.microsoft.com/office/drawing/2014/main" xmlns="" id="{D8C9BDAA-0390-4B39-9B5C-BC95E5120DA4}"/>
+                <a16:creationId xmlns="" xmlns:a16="http://schemas.microsoft.com/office/drawing/2014/main" id="{D8C9BDAA-0390-4B39-9B5C-BC95E5120DA4}"/>
               </a:ext>
               <a:ext uri="{C183D7F6-B498-43B3-948B-1728B52AA6E4}">
-                <adec:decorative xmlns:adec="http://schemas.microsoft.com/office/drawing/2017/decorative" xmlns="" val="1"/>
+                <adec:decorative xmlns="" xmlns:adec="http://schemas.microsoft.com/office/drawing/2017/decorative" val="1"/>
               </a:ext>
             </a:extLst>
           </p:cNvPr>
@@ -11526,7 +11515,7 @@
           <p:nvPr>
             <p:extLst>
               <p:ext uri="{386F3935-93C4-4BCD-93E2-E3B085C9AB24}">
-                <p16:designElem xmlns:p16="http://schemas.microsoft.com/office/powerpoint/2015/main" xmlns="" val="1"/>
+                <p16:designElem xmlns="" xmlns:p16="http://schemas.microsoft.com/office/powerpoint/2015/main" val="1"/>
               </p:ext>
             </p:extLst>
           </p:nvPr>
@@ -11568,7 +11557,7 @@
           <p:cNvPr id="2" name="Titel 1">
             <a:extLst>
               <a:ext uri="{FF2B5EF4-FFF2-40B4-BE49-F238E27FC236}">
-                <a16:creationId xmlns:a16="http://schemas.microsoft.com/office/drawing/2014/main" xmlns="" id="{D9FC22E7-D4D8-40F3-851D-F5CDDD673BBB}"/>
+                <a16:creationId xmlns="" xmlns:a16="http://schemas.microsoft.com/office/drawing/2014/main" id="{D9FC22E7-D4D8-40F3-851D-F5CDDD673BBB}"/>
               </a:ext>
             </a:extLst>
           </p:cNvPr>
@@ -11644,10 +11633,10 @@
           <p:cNvPr id="17" name="Rectangle 16">
             <a:extLst>
               <a:ext uri="{FF2B5EF4-FFF2-40B4-BE49-F238E27FC236}">
-                <a16:creationId xmlns:a16="http://schemas.microsoft.com/office/drawing/2014/main" xmlns="" id="{F9DB1FE5-9D46-433B-99D1-2F1B8DC79855}"/>
+                <a16:creationId xmlns="" xmlns:a16="http://schemas.microsoft.com/office/drawing/2014/main" id="{F9DB1FE5-9D46-433B-99D1-2F1B8DC79855}"/>
               </a:ext>
               <a:ext uri="{C183D7F6-B498-43B3-948B-1728B52AA6E4}">
-                <adec:decorative xmlns:adec="http://schemas.microsoft.com/office/drawing/2017/decorative" xmlns="" val="1"/>
+                <adec:decorative xmlns="" xmlns:adec="http://schemas.microsoft.com/office/drawing/2017/decorative" val="1"/>
               </a:ext>
             </a:extLst>
           </p:cNvPr>
@@ -11657,7 +11646,7 @@
           <p:nvPr>
             <p:extLst>
               <p:ext uri="{386F3935-93C4-4BCD-93E2-E3B085C9AB24}">
-                <p16:designElem xmlns:p16="http://schemas.microsoft.com/office/powerpoint/2015/main" xmlns="" val="1"/>
+                <p16:designElem xmlns="" xmlns:p16="http://schemas.microsoft.com/office/powerpoint/2015/main" val="1"/>
               </p:ext>
             </p:extLst>
           </p:nvPr>
@@ -11699,7 +11688,7 @@
           <p:cNvPr id="8" name="Inhaltsplatzhalter 4">
             <a:extLst>
               <a:ext uri="{FF2B5EF4-FFF2-40B4-BE49-F238E27FC236}">
-                <a16:creationId xmlns:a16="http://schemas.microsoft.com/office/drawing/2014/main" xmlns="" id="{505EAB39-71B6-4CDF-BAE8-6F62F743A0C5}"/>
+                <a16:creationId xmlns="" xmlns:a16="http://schemas.microsoft.com/office/drawing/2014/main" id="{505EAB39-71B6-4CDF-BAE8-6F62F743A0C5}"/>
               </a:ext>
             </a:extLst>
           </p:cNvPr>
@@ -11735,7 +11724,7 @@
           <p:cNvPr id="9" name="Flussdiagramm: Verbinder 8">
             <a:extLst>
               <a:ext uri="{FF2B5EF4-FFF2-40B4-BE49-F238E27FC236}">
-                <a16:creationId xmlns:a16="http://schemas.microsoft.com/office/drawing/2014/main" xmlns="" id="{01F5D49F-8D20-4DA3-86D3-7FA5F8AD94CD}"/>
+                <a16:creationId xmlns="" xmlns:a16="http://schemas.microsoft.com/office/drawing/2014/main" id="{01F5D49F-8D20-4DA3-86D3-7FA5F8AD94CD}"/>
               </a:ext>
             </a:extLst>
           </p:cNvPr>
@@ -11787,7 +11776,7 @@
           <p:cNvPr id="7" name="Inhaltsplatzhalter 6" descr="Fragen">
             <a:extLst>
               <a:ext uri="{FF2B5EF4-FFF2-40B4-BE49-F238E27FC236}">
-                <a16:creationId xmlns:a16="http://schemas.microsoft.com/office/drawing/2014/main" xmlns="" id="{BB4769F3-A84A-45E1-9A4D-9E984E568AC4}"/>
+                <a16:creationId xmlns="" xmlns:a16="http://schemas.microsoft.com/office/drawing/2014/main" id="{BB4769F3-A84A-45E1-9A4D-9E984E568AC4}"/>
               </a:ext>
             </a:extLst>
           </p:cNvPr>
@@ -11805,7 +11794,7 @@
                 <a14:useLocalDpi xmlns:a14="http://schemas.microsoft.com/office/drawing/2010/main" val="0"/>
               </a:ext>
               <a:ext uri="{96DAC541-7B7A-43D3-8B79-37D633B846F1}">
-                <asvg:svgBlip xmlns:asvg="http://schemas.microsoft.com/office/drawing/2016/SVG/main" xmlns="" r:embed="rId4"/>
+                <asvg:svgBlip xmlns="" xmlns:asvg="http://schemas.microsoft.com/office/drawing/2016/SVG/main" r:embed="rId4"/>
               </a:ext>
             </a:extLst>
           </a:blip>
@@ -12067,7 +12056,7 @@
         <p:spPr>
           <a:xfrm>
             <a:off x="1091953" y="2041864"/>
-            <a:ext cx="10395752" cy="2585323"/>
+            <a:ext cx="10395752" cy="4801314"/>
           </a:xfrm>
           <a:prstGeom prst="rect">
             <a:avLst/>
@@ -12107,8 +12096,75 @@
             </a:pPr>
             <a:r>
               <a:rPr lang="en-US" dirty="0" smtClean="0"/>
-              <a:t>Which digits have higher average noise component (recognized better by  78 than by 784)</a:t>
-            </a:r>
+              <a:t>Which digits have higher average noise component (recognized better by  78 than by 784</a:t>
+            </a:r>
+            <a:r>
+              <a:rPr lang="en-US" dirty="0" smtClean="0"/>
+              <a:t>)</a:t>
+            </a:r>
+          </a:p>
+          <a:p>
+            <a:pPr marL="285750" indent="-285750">
+              <a:buFont typeface="Arial" panose="020B0604020202020204" pitchFamily="34" charset="0"/>
+              <a:buChar char="•"/>
+            </a:pPr>
+            <a:endParaRPr lang="en-US" dirty="0"/>
+          </a:p>
+          <a:p>
+            <a:pPr marL="285750" indent="-285750">
+              <a:buFont typeface="Arial" panose="020B0604020202020204" pitchFamily="34" charset="0"/>
+              <a:buChar char="•"/>
+            </a:pPr>
+            <a:r>
+              <a:rPr lang="en-US" dirty="0" smtClean="0"/>
+              <a:t>Other metrics for the distance calculation and their effect on the accuracy of recognition</a:t>
+            </a:r>
+          </a:p>
+          <a:p>
+            <a:pPr marL="285750" indent="-285750">
+              <a:buFont typeface="Arial" panose="020B0604020202020204" pitchFamily="34" charset="0"/>
+              <a:buChar char="•"/>
+            </a:pPr>
+            <a:endParaRPr lang="en-US" dirty="0"/>
+          </a:p>
+          <a:p>
+            <a:pPr marL="285750" indent="-285750">
+              <a:buFont typeface="Arial" panose="020B0604020202020204" pitchFamily="34" charset="0"/>
+              <a:buChar char="•"/>
+            </a:pPr>
+            <a:r>
+              <a:rPr lang="en-US" dirty="0" smtClean="0"/>
+              <a:t>Other types of dimensionality reduction methods (</a:t>
+            </a:r>
+            <a:r>
+              <a:rPr lang="en-US" dirty="0" err="1" smtClean="0"/>
+              <a:t>f.i</a:t>
+            </a:r>
+            <a:r>
+              <a:rPr lang="en-US" dirty="0" smtClean="0"/>
+              <a:t>. kernel PCA) -&gt; a hypothetical further increase in accuracy of recognition and noise elimination. </a:t>
+            </a:r>
+          </a:p>
+          <a:p>
+            <a:pPr marL="285750" indent="-285750">
+              <a:buFont typeface="Arial" panose="020B0604020202020204" pitchFamily="34" charset="0"/>
+              <a:buChar char="•"/>
+            </a:pPr>
+            <a:endParaRPr lang="en-US" dirty="0"/>
+          </a:p>
+          <a:p>
+            <a:pPr marL="285750" indent="-285750">
+              <a:buFont typeface="Arial" panose="020B0604020202020204" pitchFamily="34" charset="0"/>
+              <a:buChar char="•"/>
+            </a:pPr>
+            <a:endParaRPr lang="en-US" dirty="0" smtClean="0"/>
+          </a:p>
+          <a:p>
+            <a:pPr marL="285750" indent="-285750">
+              <a:buFont typeface="Arial" panose="020B0604020202020204" pitchFamily="34" charset="0"/>
+              <a:buChar char="•"/>
+            </a:pPr>
+            <a:endParaRPr lang="en-US" dirty="0" smtClean="0"/>
           </a:p>
           <a:p>
             <a:pPr marL="285750" indent="-285750">
@@ -12200,7 +12256,7 @@
           <p:cNvPr id="4" name="Titel 3">
             <a:extLst>
               <a:ext uri="{FF2B5EF4-FFF2-40B4-BE49-F238E27FC236}">
-                <a16:creationId xmlns:a16="http://schemas.microsoft.com/office/drawing/2014/main" xmlns="" id="{80A7F226-CA13-4B8D-B6F9-57842DF36DC8}"/>
+                <a16:creationId xmlns="" xmlns:a16="http://schemas.microsoft.com/office/drawing/2014/main" id="{80A7F226-CA13-4B8D-B6F9-57842DF36DC8}"/>
               </a:ext>
             </a:extLst>
           </p:cNvPr>
@@ -12228,7 +12284,7 @@
           <p:cNvPr id="5" name="Untertitel 4">
             <a:extLst>
               <a:ext uri="{FF2B5EF4-FFF2-40B4-BE49-F238E27FC236}">
-                <a16:creationId xmlns:a16="http://schemas.microsoft.com/office/drawing/2014/main" xmlns="" id="{293A100A-CA18-49A1-8835-38E443666125}"/>
+                <a16:creationId xmlns="" xmlns:a16="http://schemas.microsoft.com/office/drawing/2014/main" id="{293A100A-CA18-49A1-8835-38E443666125}"/>
               </a:ext>
             </a:extLst>
           </p:cNvPr>
@@ -12283,7 +12339,7 @@
           <p:cNvPr id="2" name="Titel 1">
             <a:extLst>
               <a:ext uri="{FF2B5EF4-FFF2-40B4-BE49-F238E27FC236}">
-                <a16:creationId xmlns:a16="http://schemas.microsoft.com/office/drawing/2014/main" xmlns="" id="{5CD34B0C-C4AB-4E9E-933D-FCEFA5F7386A}"/>
+                <a16:creationId xmlns="" xmlns:a16="http://schemas.microsoft.com/office/drawing/2014/main" id="{5CD34B0C-C4AB-4E9E-933D-FCEFA5F7386A}"/>
               </a:ext>
             </a:extLst>
           </p:cNvPr>
@@ -12750,7 +12806,7 @@
           <p:cNvPr id="2" name="Titel 1">
             <a:extLst>
               <a:ext uri="{FF2B5EF4-FFF2-40B4-BE49-F238E27FC236}">
-                <a16:creationId xmlns:a16="http://schemas.microsoft.com/office/drawing/2014/main" xmlns="" id="{DE62BF7E-ADBC-4B3B-8BAB-95D01E311AED}"/>
+                <a16:creationId xmlns="" xmlns:a16="http://schemas.microsoft.com/office/drawing/2014/main" id="{DE62BF7E-ADBC-4B3B-8BAB-95D01E311AED}"/>
               </a:ext>
             </a:extLst>
           </p:cNvPr>
@@ -12794,7 +12850,7 @@
           <p:cNvPr id="8" name="Gerade Verbindung mit Pfeil 7">
             <a:extLst>
               <a:ext uri="{FF2B5EF4-FFF2-40B4-BE49-F238E27FC236}">
-                <a16:creationId xmlns:a16="http://schemas.microsoft.com/office/drawing/2014/main" xmlns="" id="{A79B7D31-8930-4A5A-AA1C-06892CC18291}"/>
+                <a16:creationId xmlns="" xmlns:a16="http://schemas.microsoft.com/office/drawing/2014/main" id="{A79B7D31-8930-4A5A-AA1C-06892CC18291}"/>
               </a:ext>
             </a:extLst>
           </p:cNvPr>
@@ -12835,7 +12891,7 @@
           <p:cNvPr id="11" name="Gerade Verbindung mit Pfeil 10">
             <a:extLst>
               <a:ext uri="{FF2B5EF4-FFF2-40B4-BE49-F238E27FC236}">
-                <a16:creationId xmlns:a16="http://schemas.microsoft.com/office/drawing/2014/main" xmlns="" id="{193B10F6-7A53-474E-BC21-C9DDCDE704C0}"/>
+                <a16:creationId xmlns="" xmlns:a16="http://schemas.microsoft.com/office/drawing/2014/main" id="{193B10F6-7A53-474E-BC21-C9DDCDE704C0}"/>
               </a:ext>
             </a:extLst>
           </p:cNvPr>
@@ -12876,7 +12932,7 @@
           <p:cNvPr id="13" name="Ellipse 12">
             <a:extLst>
               <a:ext uri="{FF2B5EF4-FFF2-40B4-BE49-F238E27FC236}">
-                <a16:creationId xmlns:a16="http://schemas.microsoft.com/office/drawing/2014/main" xmlns="" id="{7469256C-C83A-4F95-96CA-1818F8942C6D}"/>
+                <a16:creationId xmlns="" xmlns:a16="http://schemas.microsoft.com/office/drawing/2014/main" id="{7469256C-C83A-4F95-96CA-1818F8942C6D}"/>
               </a:ext>
             </a:extLst>
           </p:cNvPr>
@@ -12922,7 +12978,7 @@
           <p:cNvPr id="14" name="Ellipse 13">
             <a:extLst>
               <a:ext uri="{FF2B5EF4-FFF2-40B4-BE49-F238E27FC236}">
-                <a16:creationId xmlns:a16="http://schemas.microsoft.com/office/drawing/2014/main" xmlns="" id="{FC6EE53D-2964-4925-B51C-31D899033BB5}"/>
+                <a16:creationId xmlns="" xmlns:a16="http://schemas.microsoft.com/office/drawing/2014/main" id="{FC6EE53D-2964-4925-B51C-31D899033BB5}"/>
               </a:ext>
             </a:extLst>
           </p:cNvPr>
@@ -12968,7 +13024,7 @@
           <p:cNvPr id="15" name="Ellipse 14">
             <a:extLst>
               <a:ext uri="{FF2B5EF4-FFF2-40B4-BE49-F238E27FC236}">
-                <a16:creationId xmlns:a16="http://schemas.microsoft.com/office/drawing/2014/main" xmlns="" id="{58ADDE1C-EA42-455F-8EA6-B8E3BAE0272F}"/>
+                <a16:creationId xmlns="" xmlns:a16="http://schemas.microsoft.com/office/drawing/2014/main" id="{58ADDE1C-EA42-455F-8EA6-B8E3BAE0272F}"/>
               </a:ext>
             </a:extLst>
           </p:cNvPr>
@@ -13014,7 +13070,7 @@
           <p:cNvPr id="16" name="Ellipse 15">
             <a:extLst>
               <a:ext uri="{FF2B5EF4-FFF2-40B4-BE49-F238E27FC236}">
-                <a16:creationId xmlns:a16="http://schemas.microsoft.com/office/drawing/2014/main" xmlns="" id="{896F73C8-8F04-4CC6-97C4-1DD7B5E41760}"/>
+                <a16:creationId xmlns="" xmlns:a16="http://schemas.microsoft.com/office/drawing/2014/main" id="{896F73C8-8F04-4CC6-97C4-1DD7B5E41760}"/>
               </a:ext>
             </a:extLst>
           </p:cNvPr>
@@ -13060,7 +13116,7 @@
           <p:cNvPr id="17" name="Ellipse 16">
             <a:extLst>
               <a:ext uri="{FF2B5EF4-FFF2-40B4-BE49-F238E27FC236}">
-                <a16:creationId xmlns:a16="http://schemas.microsoft.com/office/drawing/2014/main" xmlns="" id="{E834ED1C-E0F9-4D80-BC22-E8D5FF875936}"/>
+                <a16:creationId xmlns="" xmlns:a16="http://schemas.microsoft.com/office/drawing/2014/main" id="{E834ED1C-E0F9-4D80-BC22-E8D5FF875936}"/>
               </a:ext>
             </a:extLst>
           </p:cNvPr>
@@ -13114,7 +13170,7 @@
           <p:cNvPr id="18" name="Ellipse 17">
             <a:extLst>
               <a:ext uri="{FF2B5EF4-FFF2-40B4-BE49-F238E27FC236}">
-                <a16:creationId xmlns:a16="http://schemas.microsoft.com/office/drawing/2014/main" xmlns="" id="{D9C9DB88-0D38-44B0-8D62-510C1934DB2C}"/>
+                <a16:creationId xmlns="" xmlns:a16="http://schemas.microsoft.com/office/drawing/2014/main" id="{D9C9DB88-0D38-44B0-8D62-510C1934DB2C}"/>
               </a:ext>
             </a:extLst>
           </p:cNvPr>
@@ -13168,7 +13224,7 @@
           <p:cNvPr id="19" name="Ellipse 18">
             <a:extLst>
               <a:ext uri="{FF2B5EF4-FFF2-40B4-BE49-F238E27FC236}">
-                <a16:creationId xmlns:a16="http://schemas.microsoft.com/office/drawing/2014/main" xmlns="" id="{AF5D232C-9B44-46DD-9434-43BE9D322187}"/>
+                <a16:creationId xmlns="" xmlns:a16="http://schemas.microsoft.com/office/drawing/2014/main" id="{AF5D232C-9B44-46DD-9434-43BE9D322187}"/>
               </a:ext>
             </a:extLst>
           </p:cNvPr>
@@ -13222,7 +13278,7 @@
           <p:cNvPr id="20" name="Ellipse 19">
             <a:extLst>
               <a:ext uri="{FF2B5EF4-FFF2-40B4-BE49-F238E27FC236}">
-                <a16:creationId xmlns:a16="http://schemas.microsoft.com/office/drawing/2014/main" xmlns="" id="{7DBB5383-166E-4F55-B5DA-3A43707886C8}"/>
+                <a16:creationId xmlns="" xmlns:a16="http://schemas.microsoft.com/office/drawing/2014/main" id="{7DBB5383-166E-4F55-B5DA-3A43707886C8}"/>
               </a:ext>
             </a:extLst>
           </p:cNvPr>
@@ -13276,7 +13332,7 @@
           <p:cNvPr id="21" name="Rechteck 20">
             <a:extLst>
               <a:ext uri="{FF2B5EF4-FFF2-40B4-BE49-F238E27FC236}">
-                <a16:creationId xmlns:a16="http://schemas.microsoft.com/office/drawing/2014/main" xmlns="" id="{557170D4-743C-4500-AC84-115677CC29C7}"/>
+                <a16:creationId xmlns="" xmlns:a16="http://schemas.microsoft.com/office/drawing/2014/main" id="{557170D4-743C-4500-AC84-115677CC29C7}"/>
               </a:ext>
             </a:extLst>
           </p:cNvPr>
@@ -13323,7 +13379,7 @@
           <p:cNvPr id="22" name="Rechteck 21">
             <a:extLst>
               <a:ext uri="{FF2B5EF4-FFF2-40B4-BE49-F238E27FC236}">
-                <a16:creationId xmlns:a16="http://schemas.microsoft.com/office/drawing/2014/main" xmlns="" id="{CB6D8A3C-1082-4255-9556-0AE3CBADAAC2}"/>
+                <a16:creationId xmlns="" xmlns:a16="http://schemas.microsoft.com/office/drawing/2014/main" id="{CB6D8A3C-1082-4255-9556-0AE3CBADAAC2}"/>
               </a:ext>
             </a:extLst>
           </p:cNvPr>
@@ -13375,7 +13431,7 @@
           <p:cNvPr id="23" name="Stern: 5 Zacken 22">
             <a:extLst>
               <a:ext uri="{FF2B5EF4-FFF2-40B4-BE49-F238E27FC236}">
-                <a16:creationId xmlns:a16="http://schemas.microsoft.com/office/drawing/2014/main" xmlns="" id="{30ACAD23-06F1-4109-8CB7-3983EAC26B6E}"/>
+                <a16:creationId xmlns="" xmlns:a16="http://schemas.microsoft.com/office/drawing/2014/main" id="{30ACAD23-06F1-4109-8CB7-3983EAC26B6E}"/>
               </a:ext>
             </a:extLst>
           </p:cNvPr>
@@ -13429,7 +13485,7 @@
           <p:cNvPr id="24" name="Ellipse 23">
             <a:extLst>
               <a:ext uri="{FF2B5EF4-FFF2-40B4-BE49-F238E27FC236}">
-                <a16:creationId xmlns:a16="http://schemas.microsoft.com/office/drawing/2014/main" xmlns="" id="{1E130FB0-31E0-48E1-BBE6-B0DDCA3F1952}"/>
+                <a16:creationId xmlns="" xmlns:a16="http://schemas.microsoft.com/office/drawing/2014/main" id="{1E130FB0-31E0-48E1-BBE6-B0DDCA3F1952}"/>
               </a:ext>
             </a:extLst>
           </p:cNvPr>
@@ -13481,7 +13537,7 @@
           <p:cNvPr id="25" name="Ellipse 24">
             <a:extLst>
               <a:ext uri="{FF2B5EF4-FFF2-40B4-BE49-F238E27FC236}">
-                <a16:creationId xmlns:a16="http://schemas.microsoft.com/office/drawing/2014/main" xmlns="" id="{909F81B8-BBC3-41DE-BFEA-18D8DE20A4A0}"/>
+                <a16:creationId xmlns="" xmlns:a16="http://schemas.microsoft.com/office/drawing/2014/main" id="{909F81B8-BBC3-41DE-BFEA-18D8DE20A4A0}"/>
               </a:ext>
             </a:extLst>
           </p:cNvPr>
@@ -13533,7 +13589,7 @@
           <p:cNvPr id="26" name="Textfeld 25">
             <a:extLst>
               <a:ext uri="{FF2B5EF4-FFF2-40B4-BE49-F238E27FC236}">
-                <a16:creationId xmlns:a16="http://schemas.microsoft.com/office/drawing/2014/main" xmlns="" id="{E1A66F3B-E0D0-47BD-BF9A-2E68700102D7}"/>
+                <a16:creationId xmlns="" xmlns:a16="http://schemas.microsoft.com/office/drawing/2014/main" id="{E1A66F3B-E0D0-47BD-BF9A-2E68700102D7}"/>
               </a:ext>
             </a:extLst>
           </p:cNvPr>
@@ -14224,10 +14280,10 @@
           <p:cNvPr id="12" name="Rectangle 11">
             <a:extLst>
               <a:ext uri="{FF2B5EF4-FFF2-40B4-BE49-F238E27FC236}">
-                <a16:creationId xmlns:a16="http://schemas.microsoft.com/office/drawing/2014/main" xmlns="" id="{B44C3061-D558-447B-A988-09ECE14461D7}"/>
+                <a16:creationId xmlns="" xmlns:a16="http://schemas.microsoft.com/office/drawing/2014/main" id="{B44C3061-D558-447B-A988-09ECE14461D7}"/>
               </a:ext>
               <a:ext uri="{C183D7F6-B498-43B3-948B-1728B52AA6E4}">
-                <adec:decorative xmlns:adec="http://schemas.microsoft.com/office/drawing/2017/decorative" xmlns="" val="1"/>
+                <adec:decorative xmlns="" xmlns:adec="http://schemas.microsoft.com/office/drawing/2017/decorative" val="1"/>
               </a:ext>
             </a:extLst>
           </p:cNvPr>
@@ -14237,7 +14293,7 @@
           <p:nvPr>
             <p:extLst>
               <p:ext uri="{386F3935-93C4-4BCD-93E2-E3B085C9AB24}">
-                <p16:designElem xmlns:p16="http://schemas.microsoft.com/office/powerpoint/2015/main" xmlns="" val="1"/>
+                <p16:designElem xmlns="" xmlns:p16="http://schemas.microsoft.com/office/powerpoint/2015/main" val="1"/>
               </p:ext>
             </p:extLst>
           </p:nvPr>
@@ -14284,10 +14340,10 @@
           <p:cNvPr id="14" name="Rectangle 13">
             <a:extLst>
               <a:ext uri="{FF2B5EF4-FFF2-40B4-BE49-F238E27FC236}">
-                <a16:creationId xmlns:a16="http://schemas.microsoft.com/office/drawing/2014/main" xmlns="" id="{59339771-9C8F-497E-8974-E09A86FEEB23}"/>
+                <a16:creationId xmlns="" xmlns:a16="http://schemas.microsoft.com/office/drawing/2014/main" id="{59339771-9C8F-497E-8974-E09A86FEEB23}"/>
               </a:ext>
               <a:ext uri="{C183D7F6-B498-43B3-948B-1728B52AA6E4}">
-                <adec:decorative xmlns:adec="http://schemas.microsoft.com/office/drawing/2017/decorative" xmlns="" val="1"/>
+                <adec:decorative xmlns="" xmlns:adec="http://schemas.microsoft.com/office/drawing/2017/decorative" val="1"/>
               </a:ext>
             </a:extLst>
           </p:cNvPr>
@@ -14297,7 +14353,7 @@
           <p:nvPr>
             <p:extLst>
               <p:ext uri="{386F3935-93C4-4BCD-93E2-E3B085C9AB24}">
-                <p16:designElem xmlns:p16="http://schemas.microsoft.com/office/powerpoint/2015/main" xmlns="" val="1"/>
+                <p16:designElem xmlns="" xmlns:p16="http://schemas.microsoft.com/office/powerpoint/2015/main" val="1"/>
               </p:ext>
             </p:extLst>
           </p:nvPr>
@@ -14339,7 +14395,7 @@
           <p:cNvPr id="2" name="Titel 1">
             <a:extLst>
               <a:ext uri="{FF2B5EF4-FFF2-40B4-BE49-F238E27FC236}">
-                <a16:creationId xmlns:a16="http://schemas.microsoft.com/office/drawing/2014/main" xmlns="" id="{024FB30C-45D5-4A6E-861B-AC316BA5D430}"/>
+                <a16:creationId xmlns="" xmlns:a16="http://schemas.microsoft.com/office/drawing/2014/main" id="{024FB30C-45D5-4A6E-861B-AC316BA5D430}"/>
               </a:ext>
             </a:extLst>
           </p:cNvPr>
@@ -14407,7 +14463,7 @@
           <p:cNvPr id="9" name="Content Placeholder 8">
             <a:extLst>
               <a:ext uri="{FF2B5EF4-FFF2-40B4-BE49-F238E27FC236}">
-                <a16:creationId xmlns:a16="http://schemas.microsoft.com/office/drawing/2014/main" xmlns="" id="{1C0D0782-8490-4FB9-A235-992C1F1F1C25}"/>
+                <a16:creationId xmlns="" xmlns:a16="http://schemas.microsoft.com/office/drawing/2014/main" id="{1C0D0782-8490-4FB9-A235-992C1F1F1C25}"/>
               </a:ext>
             </a:extLst>
           </p:cNvPr>
@@ -14508,10 +14564,10 @@
           <p:cNvPr id="16" name="Rectangle 15">
             <a:extLst>
               <a:ext uri="{FF2B5EF4-FFF2-40B4-BE49-F238E27FC236}">
-                <a16:creationId xmlns:a16="http://schemas.microsoft.com/office/drawing/2014/main" xmlns="" id="{BDB54B0B-6CFB-4B92-A5DC-5DCD05BE5B4D}"/>
+                <a16:creationId xmlns="" xmlns:a16="http://schemas.microsoft.com/office/drawing/2014/main" id="{BDB54B0B-6CFB-4B92-A5DC-5DCD05BE5B4D}"/>
               </a:ext>
               <a:ext uri="{C183D7F6-B498-43B3-948B-1728B52AA6E4}">
-                <adec:decorative xmlns:adec="http://schemas.microsoft.com/office/drawing/2017/decorative" xmlns="" val="1"/>
+                <adec:decorative xmlns="" xmlns:adec="http://schemas.microsoft.com/office/drawing/2017/decorative" val="1"/>
               </a:ext>
             </a:extLst>
           </p:cNvPr>
@@ -14521,7 +14577,7 @@
           <p:nvPr>
             <p:extLst>
               <p:ext uri="{386F3935-93C4-4BCD-93E2-E3B085C9AB24}">
-                <p16:designElem xmlns:p16="http://schemas.microsoft.com/office/powerpoint/2015/main" xmlns="" val="1"/>
+                <p16:designElem xmlns="" xmlns:p16="http://schemas.microsoft.com/office/powerpoint/2015/main" val="1"/>
               </p:ext>
             </p:extLst>
           </p:nvPr>
@@ -14563,7 +14619,7 @@
           <p:cNvPr id="7" name="Inhaltsplatzhalter 3">
             <a:extLst>
               <a:ext uri="{FF2B5EF4-FFF2-40B4-BE49-F238E27FC236}">
-                <a16:creationId xmlns:a16="http://schemas.microsoft.com/office/drawing/2014/main" xmlns="" id="{98A9C15B-CCC4-4E5C-B799-5CC331BD3332}"/>
+                <a16:creationId xmlns="" xmlns:a16="http://schemas.microsoft.com/office/drawing/2014/main" id="{98A9C15B-CCC4-4E5C-B799-5CC331BD3332}"/>
               </a:ext>
             </a:extLst>
           </p:cNvPr>
@@ -14622,7 +14678,7 @@
           <p:cNvPr id="2" name="Titel 1">
             <a:extLst>
               <a:ext uri="{FF2B5EF4-FFF2-40B4-BE49-F238E27FC236}">
-                <a16:creationId xmlns:a16="http://schemas.microsoft.com/office/drawing/2014/main" xmlns="" id="{2D19F794-8599-4A1D-A689-743EBDA80DB4}"/>
+                <a16:creationId xmlns="" xmlns:a16="http://schemas.microsoft.com/office/drawing/2014/main" id="{2D19F794-8599-4A1D-A689-743EBDA80DB4}"/>
               </a:ext>
             </a:extLst>
           </p:cNvPr>
@@ -14667,7 +14723,7 @@
           <p:cNvPr id="4" name="Textfeld 3">
             <a:extLst>
               <a:ext uri="{FF2B5EF4-FFF2-40B4-BE49-F238E27FC236}">
-                <a16:creationId xmlns:a16="http://schemas.microsoft.com/office/drawing/2014/main" xmlns="" id="{5E36B305-D4C6-4B27-9782-732C3867DEA7}"/>
+                <a16:creationId xmlns="" xmlns:a16="http://schemas.microsoft.com/office/drawing/2014/main" id="{5E36B305-D4C6-4B27-9782-732C3867DEA7}"/>
               </a:ext>
             </a:extLst>
           </p:cNvPr>
@@ -15283,7 +15339,7 @@
           <p:cNvPr id="2" name="Titel 1">
             <a:extLst>
               <a:ext uri="{FF2B5EF4-FFF2-40B4-BE49-F238E27FC236}">
-                <a16:creationId xmlns:a16="http://schemas.microsoft.com/office/drawing/2014/main" xmlns="" id="{F6CDE045-1C18-44A9-946E-E74089FBB179}"/>
+                <a16:creationId xmlns="" xmlns:a16="http://schemas.microsoft.com/office/drawing/2014/main" id="{F6CDE045-1C18-44A9-946E-E74089FBB179}"/>
               </a:ext>
             </a:extLst>
           </p:cNvPr>
@@ -15325,7 +15381,7 @@
           <p:cNvPr id="5" name="Inhaltsplatzhalter 4">
             <a:extLst>
               <a:ext uri="{FF2B5EF4-FFF2-40B4-BE49-F238E27FC236}">
-                <a16:creationId xmlns:a16="http://schemas.microsoft.com/office/drawing/2014/main" xmlns="" id="{C2F4A0CB-AF1A-4BE8-829B-9C5B7E49D064}"/>
+                <a16:creationId xmlns="" xmlns:a16="http://schemas.microsoft.com/office/drawing/2014/main" id="{C2F4A0CB-AF1A-4BE8-829B-9C5B7E49D064}"/>
               </a:ext>
             </a:extLst>
           </p:cNvPr>
@@ -15390,7 +15446,7 @@
           <p:cNvPr id="3" name="Inhaltsplatzhalter 2">
             <a:extLst>
               <a:ext uri="{FF2B5EF4-FFF2-40B4-BE49-F238E27FC236}">
-                <a16:creationId xmlns:a16="http://schemas.microsoft.com/office/drawing/2014/main" xmlns="" id="{56D22BFB-FDAA-4D7E-88D9-C29E57B7C51D}"/>
+                <a16:creationId xmlns="" xmlns:a16="http://schemas.microsoft.com/office/drawing/2014/main" id="{56D22BFB-FDAA-4D7E-88D9-C29E57B7C51D}"/>
               </a:ext>
             </a:extLst>
           </p:cNvPr>
@@ -15429,7 +15485,7 @@
           <p:cNvPr id="4" name="Inhaltsplatzhalter 3">
             <a:extLst>
               <a:ext uri="{FF2B5EF4-FFF2-40B4-BE49-F238E27FC236}">
-                <a16:creationId xmlns:a16="http://schemas.microsoft.com/office/drawing/2014/main" xmlns="" id="{370A4785-6A67-4835-A53B-8D4F4DA15C1E}"/>
+                <a16:creationId xmlns="" xmlns:a16="http://schemas.microsoft.com/office/drawing/2014/main" id="{370A4785-6A67-4835-A53B-8D4F4DA15C1E}"/>
               </a:ext>
             </a:extLst>
           </p:cNvPr>
@@ -15459,7 +15515,7 @@
           <p:cNvPr id="5" name="Grafik 7">
             <a:extLst>
               <a:ext uri="{FF2B5EF4-FFF2-40B4-BE49-F238E27FC236}">
-                <a16:creationId xmlns:a16="http://schemas.microsoft.com/office/drawing/2014/main" xmlns="" id="{5252049F-1455-46B7-9B58-C400DA353D3F}"/>
+                <a16:creationId xmlns="" xmlns:a16="http://schemas.microsoft.com/office/drawing/2014/main" id="{5252049F-1455-46B7-9B58-C400DA353D3F}"/>
               </a:ext>
             </a:extLst>
           </p:cNvPr>
@@ -15489,7 +15545,7 @@
           <p:cNvPr id="6" name="Textfeld 9">
             <a:extLst>
               <a:ext uri="{FF2B5EF4-FFF2-40B4-BE49-F238E27FC236}">
-                <a16:creationId xmlns:a16="http://schemas.microsoft.com/office/drawing/2014/main" xmlns="" id="{DEDCDEB8-1162-4AAC-93D8-F1A1F6FB9B4B}"/>
+                <a16:creationId xmlns="" xmlns:a16="http://schemas.microsoft.com/office/drawing/2014/main" id="{DEDCDEB8-1162-4AAC-93D8-F1A1F6FB9B4B}"/>
               </a:ext>
             </a:extLst>
           </p:cNvPr>
@@ -15703,7 +15759,7 @@
           <p:cNvPr id="7" name="Titel 1">
             <a:extLst>
               <a:ext uri="{FF2B5EF4-FFF2-40B4-BE49-F238E27FC236}">
-                <a16:creationId xmlns:a16="http://schemas.microsoft.com/office/drawing/2014/main" xmlns="" id="{3D022FA1-1227-4EA1-8EB1-679CE9C5CFCD}"/>
+                <a16:creationId xmlns="" xmlns:a16="http://schemas.microsoft.com/office/drawing/2014/main" id="{3D022FA1-1227-4EA1-8EB1-679CE9C5CFCD}"/>
               </a:ext>
             </a:extLst>
           </p:cNvPr>
@@ -15862,6 +15918,243 @@
           <a:chExt cx="0" cy="0"/>
         </a:xfrm>
       </p:grpSpPr>
+      <p:sp>
+        <p:nvSpPr>
+          <p:cNvPr id="2" name="TextBox 1"/>
+          <p:cNvSpPr txBox="1"/>
+          <p:nvPr/>
+        </p:nvSpPr>
+        <p:spPr>
+          <a:xfrm>
+            <a:off x="266329" y="104028"/>
+            <a:ext cx="11487705" cy="769441"/>
+          </a:xfrm>
+          <a:prstGeom prst="rect">
+            <a:avLst/>
+          </a:prstGeom>
+          <a:noFill/>
+        </p:spPr>
+        <p:txBody>
+          <a:bodyPr wrap="square" rtlCol="0">
+            <a:spAutoFit/>
+          </a:bodyPr>
+          <a:lstStyle/>
+          <a:p>
+            <a:r>
+              <a:rPr lang="en-US" sz="4400" dirty="0" smtClean="0">
+                <a:solidFill>
+                  <a:schemeClr val="tx1">
+                    <a:lumMod val="75000"/>
+                    <a:lumOff val="25000"/>
+                  </a:schemeClr>
+                </a:solidFill>
+              </a:rPr>
+              <a:t>Interesting tendencies</a:t>
+            </a:r>
+            <a:endParaRPr lang="ru-RU" sz="4400" dirty="0">
+              <a:solidFill>
+                <a:schemeClr val="tx1">
+                  <a:lumMod val="75000"/>
+                  <a:lumOff val="25000"/>
+                </a:schemeClr>
+              </a:solidFill>
+            </a:endParaRPr>
+          </a:p>
+        </p:txBody>
+      </p:sp>
+      <p:cxnSp>
+        <p:nvCxnSpPr>
+          <p:cNvPr id="3" name="Прямая соединительная линия 2"/>
+          <p:cNvCxnSpPr/>
+          <p:nvPr/>
+        </p:nvCxnSpPr>
+        <p:spPr>
+          <a:xfrm flipV="1">
+            <a:off x="0" y="873468"/>
+            <a:ext cx="12192000" cy="1"/>
+          </a:xfrm>
+          <a:prstGeom prst="line">
+            <a:avLst/>
+          </a:prstGeom>
+          <a:ln>
+            <a:solidFill>
+              <a:schemeClr val="tx2">
+                <a:lumMod val="40000"/>
+                <a:lumOff val="60000"/>
+              </a:schemeClr>
+            </a:solidFill>
+          </a:ln>
+        </p:spPr>
+        <p:style>
+          <a:lnRef idx="1">
+            <a:schemeClr val="accent1"/>
+          </a:lnRef>
+          <a:fillRef idx="0">
+            <a:schemeClr val="accent1"/>
+          </a:fillRef>
+          <a:effectRef idx="0">
+            <a:schemeClr val="accent1"/>
+          </a:effectRef>
+          <a:fontRef idx="minor">
+            <a:schemeClr val="tx1"/>
+          </a:fontRef>
+        </p:style>
+      </p:cxnSp>
+      <p:sp>
+        <p:nvSpPr>
+          <p:cNvPr id="4" name="TextBox 3"/>
+          <p:cNvSpPr txBox="1"/>
+          <p:nvPr/>
+        </p:nvSpPr>
+        <p:spPr>
+          <a:xfrm>
+            <a:off x="106531" y="994299"/>
+            <a:ext cx="9090734" cy="923330"/>
+          </a:xfrm>
+          <a:prstGeom prst="rect">
+            <a:avLst/>
+          </a:prstGeom>
+          <a:noFill/>
+        </p:spPr>
+        <p:txBody>
+          <a:bodyPr wrap="square" rtlCol="0">
+            <a:spAutoFit/>
+          </a:bodyPr>
+          <a:lstStyle/>
+          <a:p>
+            <a:pPr marL="285750" indent="-285750">
+              <a:buFont typeface="Arial" panose="020B0604020202020204" pitchFamily="34" charset="0"/>
+              <a:buChar char="•"/>
+            </a:pPr>
+            <a:r>
+              <a:rPr lang="de-DE" dirty="0"/>
+              <a:t>2 </a:t>
+            </a:r>
+            <a:r>
+              <a:rPr lang="de-DE" dirty="0" err="1"/>
+              <a:t>dimensions</a:t>
+            </a:r>
+            <a:r>
+              <a:rPr lang="de-DE" dirty="0"/>
+              <a:t>: </a:t>
+            </a:r>
+            <a:r>
+              <a:rPr lang="de-DE" dirty="0" err="1"/>
+              <a:t>less</a:t>
+            </a:r>
+            <a:r>
+              <a:rPr lang="de-DE" dirty="0"/>
+              <a:t> </a:t>
+            </a:r>
+            <a:r>
+              <a:rPr lang="de-DE" dirty="0" err="1"/>
+              <a:t>than</a:t>
+            </a:r>
+            <a:r>
+              <a:rPr lang="de-DE" dirty="0"/>
+              <a:t> 5% </a:t>
+            </a:r>
+            <a:r>
+              <a:rPr lang="de-DE" dirty="0" err="1"/>
+              <a:t>variance</a:t>
+            </a:r>
+            <a:r>
+              <a:rPr lang="de-DE" dirty="0"/>
+              <a:t>, but </a:t>
+            </a:r>
+            <a:r>
+              <a:rPr lang="de-DE" dirty="0" err="1"/>
+              <a:t>more</a:t>
+            </a:r>
+            <a:r>
+              <a:rPr lang="de-DE" dirty="0"/>
+              <a:t> </a:t>
+            </a:r>
+            <a:r>
+              <a:rPr lang="de-DE" dirty="0" err="1"/>
+              <a:t>than</a:t>
+            </a:r>
+            <a:r>
+              <a:rPr lang="de-DE" dirty="0"/>
+              <a:t> 30% </a:t>
+            </a:r>
+            <a:r>
+              <a:rPr lang="de-DE" dirty="0" err="1"/>
+              <a:t>accuracy</a:t>
+            </a:r>
+            <a:endParaRPr lang="de-DE" dirty="0"/>
+          </a:p>
+          <a:p>
+            <a:pPr marL="285750" indent="-285750">
+              <a:buFont typeface="Arial" panose="020B0604020202020204" pitchFamily="34" charset="0"/>
+              <a:buChar char="•"/>
+            </a:pPr>
+            <a:r>
+              <a:rPr lang="de-DE" dirty="0"/>
+              <a:t>3 </a:t>
+            </a:r>
+            <a:r>
+              <a:rPr lang="de-DE" dirty="0" err="1"/>
+              <a:t>dimensions</a:t>
+            </a:r>
+            <a:r>
+              <a:rPr lang="de-DE" dirty="0"/>
+              <a:t>: 5% </a:t>
+            </a:r>
+            <a:r>
+              <a:rPr lang="de-DE" dirty="0" err="1"/>
+              <a:t>variance</a:t>
+            </a:r>
+            <a:r>
+              <a:rPr lang="de-DE" dirty="0"/>
+              <a:t>, </a:t>
+            </a:r>
+            <a:r>
+              <a:rPr lang="de-DE" dirty="0" err="1"/>
+              <a:t>the</a:t>
+            </a:r>
+            <a:r>
+              <a:rPr lang="de-DE" dirty="0"/>
+              <a:t> </a:t>
+            </a:r>
+            <a:r>
+              <a:rPr lang="de-DE" dirty="0" err="1"/>
+              <a:t>highest</a:t>
+            </a:r>
+            <a:r>
+              <a:rPr lang="de-DE" dirty="0"/>
+              <a:t> </a:t>
+            </a:r>
+            <a:r>
+              <a:rPr lang="de-DE" dirty="0" err="1"/>
+              <a:t>increase</a:t>
+            </a:r>
+            <a:r>
+              <a:rPr lang="de-DE" dirty="0"/>
+              <a:t> in </a:t>
+            </a:r>
+            <a:r>
+              <a:rPr lang="de-DE" dirty="0" err="1"/>
+              <a:t>accuracy</a:t>
+            </a:r>
+            <a:r>
+              <a:rPr lang="de-DE" dirty="0"/>
+              <a:t> (</a:t>
+            </a:r>
+            <a:r>
+              <a:rPr lang="de-DE" dirty="0" err="1"/>
+              <a:t>to</a:t>
+            </a:r>
+            <a:r>
+              <a:rPr lang="de-DE" dirty="0"/>
+              <a:t> 50%)</a:t>
+            </a:r>
+          </a:p>
+          <a:p>
+            <a:endParaRPr lang="ru-RU" dirty="0"/>
+          </a:p>
+        </p:txBody>
+      </p:sp>
     </p:spTree>
     <p:extLst>
       <p:ext uri="{BB962C8B-B14F-4D97-AF65-F5344CB8AC3E}">
@@ -16658,7 +16951,7 @@
   <a:extraClrSchemeLst/>
   <a:extLst>
     <a:ext uri="{05A4C25C-085E-4340-85A3-A5531E510DB2}">
-      <thm15:themeFamily xmlns:thm15="http://schemas.microsoft.com/office/thememl/2012/main" xmlns="" name="Retrospect" id="{5F128B03-DCCA-4EEB-AB3B-CF2899314A46}" vid="{9CC26709-368C-4D72-9060-94E5B3FF3CD6}"/>
+      <thm15:themeFamily xmlns="" xmlns:thm15="http://schemas.microsoft.com/office/thememl/2012/main" name="Retrospect" id="{5F128B03-DCCA-4EEB-AB3B-CF2899314A46}" vid="{9CC26709-368C-4D72-9060-94E5B3FF3CD6}"/>
     </a:ext>
   </a:extLst>
 </a:theme>

</xml_diff>